<commit_message>
Updated presentation and code, added projection
</commit_message>
<xml_diff>
--- a/Presentation/Proof_of_concept.pptx
+++ b/Presentation/Proof_of_concept.pptx
@@ -5,10 +5,10 @@
     <p:sldMasterId id="2147483648" r:id="rId4"/>
   </p:sldMasterIdLst>
   <p:notesMasterIdLst>
-    <p:notesMasterId r:id="rId16"/>
+    <p:notesMasterId r:id="rId17"/>
   </p:notesMasterIdLst>
   <p:handoutMasterIdLst>
-    <p:handoutMasterId r:id="rId17"/>
+    <p:handoutMasterId r:id="rId18"/>
   </p:handoutMasterIdLst>
   <p:sldIdLst>
     <p:sldId id="256" r:id="rId5"/>
@@ -19,9 +19,10 @@
     <p:sldId id="303" r:id="rId10"/>
     <p:sldId id="305" r:id="rId11"/>
     <p:sldId id="306" r:id="rId12"/>
-    <p:sldId id="295" r:id="rId13"/>
-    <p:sldId id="287" r:id="rId14"/>
-    <p:sldId id="272" r:id="rId15"/>
+    <p:sldId id="308" r:id="rId13"/>
+    <p:sldId id="295" r:id="rId14"/>
+    <p:sldId id="287" r:id="rId15"/>
+    <p:sldId id="272" r:id="rId16"/>
   </p:sldIdLst>
   <p:sldSz cx="12192000" cy="6858000"/>
   <p:notesSz cx="6858000" cy="9144000"/>
@@ -904,14 +905,7 @@
               <a:latin typeface="Arial" panose="020B0604020202020204" pitchFamily="34" charset="0"/>
               <a:cs typeface="Arial" panose="020B0604020202020204" pitchFamily="34" charset="0"/>
             </a:rPr>
-            <a:t>Well </a:t>
-          </a:r>
-          <a:r>
-            <a:rPr lang="en-US" dirty="0" smtClean="0">
-              <a:latin typeface="Arial" panose="020B0604020202020204" pitchFamily="34" charset="0"/>
-              <a:cs typeface="Arial" panose="020B0604020202020204" pitchFamily="34" charset="0"/>
-            </a:rPr>
-            <a:t>Spec.</a:t>
+            <a:t>Well Spec.</a:t>
           </a:r>
           <a:endParaRPr lang="en-US" dirty="0">
             <a:latin typeface="Arial" panose="020B0604020202020204" pitchFamily="34" charset="0"/>
@@ -1396,8 +1390,8 @@
       </dsp:nvSpPr>
       <dsp:spPr>
         <a:xfrm>
-          <a:off x="643309" y="1399182"/>
-          <a:ext cx="2553890" cy="2232421"/>
+          <a:off x="685990" y="1733253"/>
+          <a:ext cx="2723331" cy="2380534"/>
         </a:xfrm>
         <a:prstGeom prst="rightArrow">
           <a:avLst>
@@ -1444,12 +1438,12 @@
         <a:fontRef idx="minor"/>
       </dsp:style>
       <dsp:txBody>
-        <a:bodyPr spcFirstLastPara="0" vert="horz" wrap="square" lIns="43180" tIns="10795" rIns="21590" bIns="10795" numCol="1" spcCol="1270" anchor="ctr" anchorCtr="0">
+        <a:bodyPr spcFirstLastPara="0" vert="horz" wrap="square" lIns="45720" tIns="11430" rIns="22860" bIns="11430" numCol="1" spcCol="1270" anchor="ctr" anchorCtr="0">
           <a:noAutofit/>
         </a:bodyPr>
         <a:lstStyle/>
         <a:p>
-          <a:pPr lvl="0" algn="ctr" defTabSz="755650">
+          <a:pPr lvl="0" algn="ctr" defTabSz="800100">
             <a:lnSpc>
               <a:spcPct val="90000"/>
             </a:lnSpc>
@@ -1461,21 +1455,21 @@
             </a:spcAft>
           </a:pPr>
           <a:r>
-            <a:rPr lang="en-US" sz="1700" kern="1200" dirty="0" smtClean="0">
+            <a:rPr lang="en-US" sz="1800" kern="1200" dirty="0" smtClean="0">
               <a:latin typeface="Arial" panose="020B0604020202020204" pitchFamily="34" charset="0"/>
               <a:cs typeface="Arial" panose="020B0604020202020204" pitchFamily="34" charset="0"/>
             </a:rPr>
             <a:t>Coordinates</a:t>
           </a:r>
-          <a:endParaRPr lang="en-US" sz="1700" kern="1200" dirty="0">
+          <a:endParaRPr lang="en-US" sz="1800" kern="1200" dirty="0">
             <a:latin typeface="Arial" panose="020B0604020202020204" pitchFamily="34" charset="0"/>
             <a:cs typeface="Arial" panose="020B0604020202020204" pitchFamily="34" charset="0"/>
           </a:endParaRPr>
         </a:p>
       </dsp:txBody>
       <dsp:txXfrm>
-        <a:off x="1281782" y="1734045"/>
-        <a:ext cx="1245021" cy="1562695"/>
+        <a:off x="1366823" y="2090333"/>
+        <a:ext cx="1327624" cy="1666374"/>
       </dsp:txXfrm>
     </dsp:sp>
     <dsp:sp modelId="{960A5C71-8B8B-4663-9E81-F346BE02F572}">
@@ -1485,8 +1479,8 @@
       </dsp:nvSpPr>
       <dsp:spPr>
         <a:xfrm>
-          <a:off x="4836" y="1876920"/>
-          <a:ext cx="1276945" cy="1276945"/>
+          <a:off x="5157" y="2242687"/>
+          <a:ext cx="1361665" cy="1361665"/>
         </a:xfrm>
         <a:prstGeom prst="ellipse">
           <a:avLst/>
@@ -1528,12 +1522,12 @@
         </a:fontRef>
       </dsp:style>
       <dsp:txBody>
-        <a:bodyPr spcFirstLastPara="0" vert="horz" wrap="square" lIns="9525" tIns="9525" rIns="9525" bIns="9525" numCol="1" spcCol="1270" anchor="ctr" anchorCtr="0">
+        <a:bodyPr spcFirstLastPara="0" vert="horz" wrap="square" lIns="10160" tIns="10160" rIns="10160" bIns="10160" numCol="1" spcCol="1270" anchor="ctr" anchorCtr="0">
           <a:noAutofit/>
         </a:bodyPr>
         <a:lstStyle/>
         <a:p>
-          <a:pPr lvl="0" algn="ctr" defTabSz="666750">
+          <a:pPr lvl="0" algn="ctr" defTabSz="711200">
             <a:lnSpc>
               <a:spcPct val="90000"/>
             </a:lnSpc>
@@ -1545,28 +1539,21 @@
             </a:spcAft>
           </a:pPr>
           <a:r>
-            <a:rPr lang="en-US" sz="1500" kern="1200" dirty="0" smtClean="0">
+            <a:rPr lang="en-US" sz="1600" kern="1200" dirty="0" smtClean="0">
               <a:latin typeface="Arial" panose="020B0604020202020204" pitchFamily="34" charset="0"/>
               <a:cs typeface="Arial" panose="020B0604020202020204" pitchFamily="34" charset="0"/>
             </a:rPr>
-            <a:t>Well </a:t>
+            <a:t>Well Spec.</a:t>
           </a:r>
-          <a:r>
-            <a:rPr lang="en-US" sz="1500" kern="1200" dirty="0" smtClean="0">
-              <a:latin typeface="Arial" panose="020B0604020202020204" pitchFamily="34" charset="0"/>
-              <a:cs typeface="Arial" panose="020B0604020202020204" pitchFamily="34" charset="0"/>
-            </a:rPr>
-            <a:t>Spec.</a:t>
-          </a:r>
-          <a:endParaRPr lang="en-US" sz="1500" kern="1200" dirty="0">
+          <a:endParaRPr lang="en-US" sz="1600" kern="1200" dirty="0">
             <a:latin typeface="Arial" panose="020B0604020202020204" pitchFamily="34" charset="0"/>
             <a:cs typeface="Arial" panose="020B0604020202020204" pitchFamily="34" charset="0"/>
           </a:endParaRPr>
         </a:p>
       </dsp:txBody>
       <dsp:txXfrm>
-        <a:off x="191840" y="2063924"/>
-        <a:ext cx="902937" cy="902937"/>
+        <a:off x="204568" y="2442098"/>
+        <a:ext cx="962843" cy="962843"/>
       </dsp:txXfrm>
     </dsp:sp>
     <dsp:sp modelId="{9EBF0882-37A5-400C-8800-70BB9C7BC723}">
@@ -1576,8 +1563,8 @@
       </dsp:nvSpPr>
       <dsp:spPr>
         <a:xfrm>
-          <a:off x="3995290" y="1399182"/>
-          <a:ext cx="2553890" cy="2232421"/>
+          <a:off x="4260363" y="1733253"/>
+          <a:ext cx="2723331" cy="2380534"/>
         </a:xfrm>
         <a:prstGeom prst="rightArrow">
           <a:avLst>
@@ -1624,12 +1611,12 @@
         <a:fontRef idx="minor"/>
       </dsp:style>
       <dsp:txBody>
-        <a:bodyPr spcFirstLastPara="0" vert="horz" wrap="square" lIns="43180" tIns="10795" rIns="21590" bIns="10795" numCol="1" spcCol="1270" anchor="ctr" anchorCtr="0">
+        <a:bodyPr spcFirstLastPara="0" vert="horz" wrap="square" lIns="45720" tIns="11430" rIns="22860" bIns="11430" numCol="1" spcCol="1270" anchor="ctr" anchorCtr="0">
           <a:noAutofit/>
         </a:bodyPr>
         <a:lstStyle/>
         <a:p>
-          <a:pPr lvl="0" algn="ctr" defTabSz="755650">
+          <a:pPr lvl="0" algn="ctr" defTabSz="800100">
             <a:lnSpc>
               <a:spcPct val="90000"/>
             </a:lnSpc>
@@ -1641,21 +1628,21 @@
             </a:spcAft>
           </a:pPr>
           <a:r>
-            <a:rPr lang="en-US" sz="1700" kern="1200" dirty="0" smtClean="0">
+            <a:rPr lang="en-US" sz="1800" kern="1200" dirty="0" smtClean="0">
               <a:latin typeface="Arial" panose="020B0604020202020204" pitchFamily="34" charset="0"/>
               <a:cs typeface="Arial" panose="020B0604020202020204" pitchFamily="34" charset="0"/>
             </a:rPr>
             <a:t>Find the closest wells in the area</a:t>
           </a:r>
-          <a:endParaRPr lang="en-US" sz="1700" kern="1200" dirty="0">
+          <a:endParaRPr lang="en-US" sz="1800" kern="1200" dirty="0">
             <a:latin typeface="Arial" panose="020B0604020202020204" pitchFamily="34" charset="0"/>
             <a:cs typeface="Arial" panose="020B0604020202020204" pitchFamily="34" charset="0"/>
           </a:endParaRPr>
         </a:p>
       </dsp:txBody>
       <dsp:txXfrm>
-        <a:off x="4633763" y="1734045"/>
-        <a:ext cx="1245021" cy="1562695"/>
+        <a:off x="4941196" y="2090333"/>
+        <a:ext cx="1327624" cy="1666374"/>
       </dsp:txXfrm>
     </dsp:sp>
     <dsp:sp modelId="{011C5594-72CD-4ECF-9CEB-8806EE67260F}">
@@ -1665,8 +1652,8 @@
       </dsp:nvSpPr>
       <dsp:spPr>
         <a:xfrm>
-          <a:off x="3356818" y="1876920"/>
-          <a:ext cx="1276945" cy="1276945"/>
+          <a:off x="3579530" y="2242687"/>
+          <a:ext cx="1361665" cy="1361665"/>
         </a:xfrm>
         <a:prstGeom prst="ellipse">
           <a:avLst/>
@@ -1708,12 +1695,12 @@
         </a:fontRef>
       </dsp:style>
       <dsp:txBody>
-        <a:bodyPr spcFirstLastPara="0" vert="horz" wrap="square" lIns="9525" tIns="9525" rIns="9525" bIns="9525" numCol="1" spcCol="1270" anchor="ctr" anchorCtr="0">
+        <a:bodyPr spcFirstLastPara="0" vert="horz" wrap="square" lIns="10160" tIns="10160" rIns="10160" bIns="10160" numCol="1" spcCol="1270" anchor="ctr" anchorCtr="0">
           <a:noAutofit/>
         </a:bodyPr>
         <a:lstStyle/>
         <a:p>
-          <a:pPr lvl="0" algn="ctr" defTabSz="666750">
+          <a:pPr lvl="0" algn="ctr" defTabSz="711200">
             <a:lnSpc>
               <a:spcPct val="90000"/>
             </a:lnSpc>
@@ -1725,21 +1712,21 @@
             </a:spcAft>
           </a:pPr>
           <a:r>
-            <a:rPr lang="en-US" sz="1500" kern="1200" dirty="0" smtClean="0">
+            <a:rPr lang="en-US" sz="1600" kern="1200" dirty="0" smtClean="0">
               <a:latin typeface="Arial" panose="020B0604020202020204" pitchFamily="34" charset="0"/>
               <a:cs typeface="Arial" panose="020B0604020202020204" pitchFamily="34" charset="0"/>
             </a:rPr>
             <a:t>Well Database</a:t>
           </a:r>
-          <a:endParaRPr lang="en-US" sz="1500" kern="1200" dirty="0">
+          <a:endParaRPr lang="en-US" sz="1600" kern="1200" dirty="0">
             <a:latin typeface="Arial" panose="020B0604020202020204" pitchFamily="34" charset="0"/>
             <a:cs typeface="Arial" panose="020B0604020202020204" pitchFamily="34" charset="0"/>
           </a:endParaRPr>
         </a:p>
       </dsp:txBody>
       <dsp:txXfrm>
-        <a:off x="3543822" y="2063924"/>
-        <a:ext cx="902937" cy="902937"/>
+        <a:off x="3778941" y="2442098"/>
+        <a:ext cx="962843" cy="962843"/>
       </dsp:txXfrm>
     </dsp:sp>
     <dsp:sp modelId="{0F66F88E-A7CA-45F3-8B58-FBD8FA0BC1D6}">
@@ -1749,8 +1736,8 @@
       </dsp:nvSpPr>
       <dsp:spPr>
         <a:xfrm>
-          <a:off x="7347271" y="1399182"/>
-          <a:ext cx="2553890" cy="2232421"/>
+          <a:off x="7834735" y="1733253"/>
+          <a:ext cx="2723331" cy="2380534"/>
         </a:xfrm>
         <a:prstGeom prst="rightArrow">
           <a:avLst>
@@ -1797,12 +1784,12 @@
         <a:fontRef idx="minor"/>
       </dsp:style>
       <dsp:txBody>
-        <a:bodyPr spcFirstLastPara="0" vert="horz" wrap="square" lIns="43180" tIns="10795" rIns="21590" bIns="10795" numCol="1" spcCol="1270" anchor="ctr" anchorCtr="0">
+        <a:bodyPr spcFirstLastPara="0" vert="horz" wrap="square" lIns="45720" tIns="11430" rIns="22860" bIns="11430" numCol="1" spcCol="1270" anchor="ctr" anchorCtr="0">
           <a:noAutofit/>
         </a:bodyPr>
         <a:lstStyle/>
         <a:p>
-          <a:pPr lvl="0" algn="ctr" defTabSz="755650">
+          <a:pPr lvl="0" algn="ctr" defTabSz="800100">
             <a:lnSpc>
               <a:spcPct val="90000"/>
             </a:lnSpc>
@@ -1814,21 +1801,21 @@
             </a:spcAft>
           </a:pPr>
           <a:r>
-            <a:rPr lang="en-US" sz="1700" kern="1200" dirty="0" smtClean="0">
+            <a:rPr lang="en-US" sz="1800" kern="1200" dirty="0" smtClean="0">
               <a:latin typeface="Arial" panose="020B0604020202020204" pitchFamily="34" charset="0"/>
               <a:cs typeface="Arial" panose="020B0604020202020204" pitchFamily="34" charset="0"/>
             </a:rPr>
             <a:t>Challenging area to drill ?</a:t>
           </a:r>
-          <a:endParaRPr lang="en-US" sz="1700" kern="1200" dirty="0">
+          <a:endParaRPr lang="en-US" sz="1800" kern="1200" dirty="0">
             <a:latin typeface="Arial" panose="020B0604020202020204" pitchFamily="34" charset="0"/>
             <a:cs typeface="Arial" panose="020B0604020202020204" pitchFamily="34" charset="0"/>
           </a:endParaRPr>
         </a:p>
       </dsp:txBody>
       <dsp:txXfrm>
-        <a:off x="7985744" y="1734045"/>
-        <a:ext cx="1245021" cy="1562695"/>
+        <a:off x="8515568" y="2090333"/>
+        <a:ext cx="1327624" cy="1666374"/>
       </dsp:txXfrm>
     </dsp:sp>
     <dsp:sp modelId="{C48D8AC9-AF31-4531-A9D8-F38D21217E5F}">
@@ -1838,8 +1825,8 @@
       </dsp:nvSpPr>
       <dsp:spPr>
         <a:xfrm>
-          <a:off x="6708799" y="1876920"/>
-          <a:ext cx="1276945" cy="1276945"/>
+          <a:off x="7153902" y="2242687"/>
+          <a:ext cx="1361665" cy="1361665"/>
         </a:xfrm>
         <a:prstGeom prst="ellipse">
           <a:avLst/>
@@ -1881,12 +1868,12 @@
         </a:fontRef>
       </dsp:style>
       <dsp:txBody>
-        <a:bodyPr spcFirstLastPara="0" vert="horz" wrap="square" lIns="9525" tIns="9525" rIns="9525" bIns="9525" numCol="1" spcCol="1270" anchor="ctr" anchorCtr="0">
+        <a:bodyPr spcFirstLastPara="0" vert="horz" wrap="square" lIns="10160" tIns="10160" rIns="10160" bIns="10160" numCol="1" spcCol="1270" anchor="ctr" anchorCtr="0">
           <a:noAutofit/>
         </a:bodyPr>
         <a:lstStyle/>
         <a:p>
-          <a:pPr lvl="0" algn="ctr" defTabSz="666750">
+          <a:pPr lvl="0" algn="ctr" defTabSz="711200">
             <a:lnSpc>
               <a:spcPct val="90000"/>
             </a:lnSpc>
@@ -1898,21 +1885,21 @@
             </a:spcAft>
           </a:pPr>
           <a:r>
-            <a:rPr lang="en-US" sz="1500" kern="1200" dirty="0" smtClean="0">
+            <a:rPr lang="en-US" sz="1600" kern="1200" dirty="0" smtClean="0">
               <a:latin typeface="Arial" panose="020B0604020202020204" pitchFamily="34" charset="0"/>
               <a:cs typeface="Arial" panose="020B0604020202020204" pitchFamily="34" charset="0"/>
             </a:rPr>
             <a:t>Premiums estimation</a:t>
           </a:r>
-          <a:endParaRPr lang="en-US" sz="1500" kern="1200" dirty="0">
+          <a:endParaRPr lang="en-US" sz="1600" kern="1200" dirty="0">
             <a:latin typeface="Arial" panose="020B0604020202020204" pitchFamily="34" charset="0"/>
             <a:cs typeface="Arial" panose="020B0604020202020204" pitchFamily="34" charset="0"/>
           </a:endParaRPr>
         </a:p>
       </dsp:txBody>
       <dsp:txXfrm>
-        <a:off x="6895803" y="2063924"/>
-        <a:ext cx="902937" cy="902937"/>
+        <a:off x="7353313" y="2442098"/>
+        <a:ext cx="962843" cy="962843"/>
       </dsp:txXfrm>
     </dsp:sp>
   </dsp:spTree>
@@ -3329,7 +3316,7 @@
           <a:p>
             <a:fld id="{24A79857-1142-40E9-AF58-34C20E564EDB}" type="datetimeFigureOut">
               <a:rPr lang="en-GB" smtClean="0"/>
-              <a:t>07/02/2017</a:t>
+              <a:t>08/02/2017</a:t>
             </a:fld>
             <a:endParaRPr lang="en-GB"/>
           </a:p>
@@ -3494,7 +3481,7 @@
           <a:p>
             <a:fld id="{36E3A060-39BE-493C-AEC4-1A03F10D221B}" type="datetimeFigureOut">
               <a:rPr lang="en-GB" smtClean="0"/>
-              <a:t>07/02/2017</a:t>
+              <a:t>08/02/2017</a:t>
             </a:fld>
             <a:endParaRPr lang="en-GB"/>
           </a:p>
@@ -4177,6 +4164,90 @@
     <p:extLst>
       <p:ext uri="{BB962C8B-B14F-4D97-AF65-F5344CB8AC3E}">
         <p14:creationId xmlns:p14="http://schemas.microsoft.com/office/powerpoint/2010/main" val="4052295841"/>
+      </p:ext>
+    </p:extLst>
+  </p:cSld>
+  <p:clrMapOvr>
+    <a:masterClrMapping/>
+  </p:clrMapOvr>
+</p:notes>
+</file>
+
+<file path=ppt/notesSlides/notesSlide6.xml><?xml version="1.0" encoding="utf-8"?>
+<p:notes xmlns:a="http://schemas.openxmlformats.org/drawingml/2006/main" xmlns:r="http://schemas.openxmlformats.org/officeDocument/2006/relationships" xmlns:p="http://schemas.openxmlformats.org/presentationml/2006/main">
+  <p:cSld>
+    <p:spTree>
+      <p:nvGrpSpPr>
+        <p:cNvPr id="1" name=""/>
+        <p:cNvGrpSpPr/>
+        <p:nvPr/>
+      </p:nvGrpSpPr>
+      <p:grpSpPr>
+        <a:xfrm>
+          <a:off x="0" y="0"/>
+          <a:ext cx="0" cy="0"/>
+          <a:chOff x="0" y="0"/>
+          <a:chExt cx="0" cy="0"/>
+        </a:xfrm>
+      </p:grpSpPr>
+      <p:sp>
+        <p:nvSpPr>
+          <p:cNvPr id="2" name="Slide Image Placeholder 1"/>
+          <p:cNvSpPr>
+            <a:spLocks noGrp="1" noRot="1" noChangeAspect="1"/>
+          </p:cNvSpPr>
+          <p:nvPr>
+            <p:ph type="sldImg"/>
+          </p:nvPr>
+        </p:nvSpPr>
+        <p:spPr/>
+      </p:sp>
+      <p:sp>
+        <p:nvSpPr>
+          <p:cNvPr id="3" name="Notes Placeholder 2"/>
+          <p:cNvSpPr>
+            <a:spLocks noGrp="1"/>
+          </p:cNvSpPr>
+          <p:nvPr>
+            <p:ph type="body" idx="1"/>
+          </p:nvPr>
+        </p:nvSpPr>
+        <p:spPr/>
+        <p:txBody>
+          <a:bodyPr/>
+          <a:lstStyle/>
+          <a:p>
+            <a:endParaRPr lang="en-GB" dirty="0"/>
+          </a:p>
+        </p:txBody>
+      </p:sp>
+      <p:sp>
+        <p:nvSpPr>
+          <p:cNvPr id="4" name="Slide Number Placeholder 3"/>
+          <p:cNvSpPr>
+            <a:spLocks noGrp="1"/>
+          </p:cNvSpPr>
+          <p:nvPr>
+            <p:ph type="sldNum" sz="quarter" idx="10"/>
+          </p:nvPr>
+        </p:nvSpPr>
+        <p:spPr/>
+        <p:txBody>
+          <a:bodyPr/>
+          <a:lstStyle/>
+          <a:p>
+            <a:fld id="{930A9240-7000-48E2-B53B-CED0FE0748BF}" type="slidenum">
+              <a:rPr lang="en-GB" smtClean="0"/>
+              <a:t>9</a:t>
+            </a:fld>
+            <a:endParaRPr lang="en-GB"/>
+          </a:p>
+        </p:txBody>
+      </p:sp>
+    </p:spTree>
+    <p:extLst>
+      <p:ext uri="{BB962C8B-B14F-4D97-AF65-F5344CB8AC3E}">
+        <p14:creationId xmlns:p14="http://schemas.microsoft.com/office/powerpoint/2010/main" val="1017476822"/>
       </p:ext>
     </p:extLst>
   </p:cSld>
@@ -6993,6 +7064,658 @@
             <a:spLocks noGrp="1"/>
           </p:cNvSpPr>
           <p:nvPr>
+            <p:ph type="title"/>
+          </p:nvPr>
+        </p:nvSpPr>
+        <p:spPr/>
+        <p:txBody>
+          <a:bodyPr/>
+          <a:lstStyle/>
+          <a:p>
+            <a:r>
+              <a:rPr lang="en-GB" dirty="0" smtClean="0"/>
+              <a:t>Next Step</a:t>
+            </a:r>
+            <a:br>
+              <a:rPr lang="en-GB" dirty="0" smtClean="0"/>
+            </a:br>
+            <a:r>
+              <a:rPr lang="en-GB" dirty="0" smtClean="0"/>
+              <a:t>Focus on Formation</a:t>
+            </a:r>
+            <a:endParaRPr lang="en-GB" dirty="0"/>
+          </a:p>
+        </p:txBody>
+      </p:sp>
+      <p:sp>
+        <p:nvSpPr>
+          <p:cNvPr id="3" name="Content Placeholder 2"/>
+          <p:cNvSpPr>
+            <a:spLocks noGrp="1"/>
+          </p:cNvSpPr>
+          <p:nvPr>
+            <p:ph idx="1"/>
+          </p:nvPr>
+        </p:nvSpPr>
+        <p:spPr>
+          <a:xfrm>
+            <a:off x="838200" y="1825625"/>
+            <a:ext cx="10252295" cy="4351338"/>
+          </a:xfrm>
+        </p:spPr>
+        <p:txBody>
+          <a:bodyPr/>
+          <a:lstStyle/>
+          <a:p>
+            <a:r>
+              <a:rPr lang="en-GB" dirty="0" smtClean="0"/>
+              <a:t>Some formation are more challenging to drill than others due to rock parameters and mechanics (density, cohesion, </a:t>
+            </a:r>
+            <a:r>
+              <a:rPr lang="en-GB" dirty="0" err="1" smtClean="0"/>
+              <a:t>etc</a:t>
+            </a:r>
+            <a:r>
+              <a:rPr lang="en-GB" dirty="0" smtClean="0"/>
+              <a:t> …)</a:t>
+            </a:r>
+          </a:p>
+          <a:p>
+            <a:r>
+              <a:rPr lang="en-GB" dirty="0" smtClean="0"/>
+              <a:t>From the asset specification: get the details of the expected drilled formation (type and meters drilled)</a:t>
+            </a:r>
+          </a:p>
+        </p:txBody>
+      </p:sp>
+      <p:sp>
+        <p:nvSpPr>
+          <p:cNvPr id="4" name="Slide Number Placeholder 3"/>
+          <p:cNvSpPr>
+            <a:spLocks noGrp="1"/>
+          </p:cNvSpPr>
+          <p:nvPr>
+            <p:ph type="sldNum" sz="quarter" idx="12"/>
+          </p:nvPr>
+        </p:nvSpPr>
+        <p:spPr/>
+        <p:txBody>
+          <a:bodyPr/>
+          <a:lstStyle/>
+          <a:p>
+            <a:fld id="{75468FE7-8C63-4358-B16F-C9D145C2ECC7}" type="slidenum">
+              <a:rPr lang="en-GB" smtClean="0"/>
+              <a:t>10</a:t>
+            </a:fld>
+            <a:endParaRPr lang="en-GB"/>
+          </a:p>
+        </p:txBody>
+      </p:sp>
+      <p:graphicFrame>
+        <p:nvGraphicFramePr>
+          <p:cNvPr id="6" name="Table 5"/>
+          <p:cNvGraphicFramePr>
+            <a:graphicFrameLocks noGrp="1"/>
+          </p:cNvGraphicFramePr>
+          <p:nvPr>
+            <p:extLst>
+              <p:ext uri="{D42A27DB-BD31-4B8C-83A1-F6EECF244321}">
+                <p14:modId xmlns:p14="http://schemas.microsoft.com/office/powerpoint/2010/main" val="2401891432"/>
+              </p:ext>
+            </p:extLst>
+          </p:nvPr>
+        </p:nvGraphicFramePr>
+        <p:xfrm>
+          <a:off x="2240135" y="4131775"/>
+          <a:ext cx="7742065" cy="1854200"/>
+        </p:xfrm>
+        <a:graphic>
+          <a:graphicData uri="http://schemas.openxmlformats.org/drawingml/2006/table">
+            <a:tbl>
+              <a:tblPr firstRow="1" bandRow="1">
+                <a:tableStyleId>{93296810-A885-4BE3-A3E7-6D5BEEA58F35}</a:tableStyleId>
+              </a:tblPr>
+              <a:tblGrid>
+                <a:gridCol w="2411866">
+                  <a:extLst>
+                    <a:ext uri="{9D8B030D-6E8A-4147-A177-3AD203B41FA5}">
+                      <a16:colId xmlns:a16="http://schemas.microsoft.com/office/drawing/2014/main" val="2951334863"/>
+                    </a:ext>
+                  </a:extLst>
+                </a:gridCol>
+                <a:gridCol w="1338580">
+                  <a:extLst>
+                    <a:ext uri="{9D8B030D-6E8A-4147-A177-3AD203B41FA5}">
+                      <a16:colId xmlns:a16="http://schemas.microsoft.com/office/drawing/2014/main" val="998366240"/>
+                    </a:ext>
+                  </a:extLst>
+                </a:gridCol>
+                <a:gridCol w="857752">
+                  <a:extLst>
+                    <a:ext uri="{9D8B030D-6E8A-4147-A177-3AD203B41FA5}">
+                      <a16:colId xmlns:a16="http://schemas.microsoft.com/office/drawing/2014/main" val="1910192795"/>
+                    </a:ext>
+                  </a:extLst>
+                </a:gridCol>
+                <a:gridCol w="2068168">
+                  <a:extLst>
+                    <a:ext uri="{9D8B030D-6E8A-4147-A177-3AD203B41FA5}">
+                      <a16:colId xmlns:a16="http://schemas.microsoft.com/office/drawing/2014/main" val="2200037103"/>
+                    </a:ext>
+                  </a:extLst>
+                </a:gridCol>
+                <a:gridCol w="1065699">
+                  <a:extLst>
+                    <a:ext uri="{9D8B030D-6E8A-4147-A177-3AD203B41FA5}">
+                      <a16:colId xmlns:a16="http://schemas.microsoft.com/office/drawing/2014/main" val="3699722109"/>
+                    </a:ext>
+                  </a:extLst>
+                </a:gridCol>
+              </a:tblGrid>
+              <a:tr h="370840">
+                <a:tc>
+                  <a:txBody>
+                    <a:bodyPr/>
+                    <a:lstStyle/>
+                    <a:p>
+                      <a:pPr algn="ctr"/>
+                      <a:r>
+                        <a:rPr lang="en-GB" dirty="0" smtClean="0">
+                          <a:latin typeface="Arial" panose="020B0604020202020204" pitchFamily="34" charset="0"/>
+                          <a:cs typeface="Arial" panose="020B0604020202020204" pitchFamily="34" charset="0"/>
+                        </a:rPr>
+                        <a:t>Formation Name</a:t>
+                      </a:r>
+                      <a:endParaRPr lang="en-GB" dirty="0">
+                        <a:latin typeface="Arial" panose="020B0604020202020204" pitchFamily="34" charset="0"/>
+                        <a:cs typeface="Arial" panose="020B0604020202020204" pitchFamily="34" charset="0"/>
+                      </a:endParaRPr>
+                    </a:p>
+                  </a:txBody>
+                  <a:tcPr/>
+                </a:tc>
+                <a:tc>
+                  <a:txBody>
+                    <a:bodyPr/>
+                    <a:lstStyle/>
+                    <a:p>
+                      <a:pPr algn="ctr"/>
+                      <a:r>
+                        <a:rPr lang="en-GB" dirty="0" smtClean="0">
+                          <a:latin typeface="Arial" panose="020B0604020202020204" pitchFamily="34" charset="0"/>
+                          <a:cs typeface="Arial" panose="020B0604020202020204" pitchFamily="34" charset="0"/>
+                        </a:rPr>
+                        <a:t>Type</a:t>
+                      </a:r>
+                      <a:endParaRPr lang="en-GB" dirty="0">
+                        <a:latin typeface="Arial" panose="020B0604020202020204" pitchFamily="34" charset="0"/>
+                        <a:cs typeface="Arial" panose="020B0604020202020204" pitchFamily="34" charset="0"/>
+                      </a:endParaRPr>
+                    </a:p>
+                  </a:txBody>
+                  <a:tcPr anchor="ctr"/>
+                </a:tc>
+                <a:tc>
+                  <a:txBody>
+                    <a:bodyPr/>
+                    <a:lstStyle/>
+                    <a:p>
+                      <a:pPr algn="ctr"/>
+                      <a:r>
+                        <a:rPr lang="en-GB" dirty="0" smtClean="0">
+                          <a:latin typeface="Arial" panose="020B0604020202020204" pitchFamily="34" charset="0"/>
+                          <a:cs typeface="Arial" panose="020B0604020202020204" pitchFamily="34" charset="0"/>
+                        </a:rPr>
+                        <a:t>Risk</a:t>
+                      </a:r>
+                      <a:endParaRPr lang="en-GB" dirty="0">
+                        <a:latin typeface="Arial" panose="020B0604020202020204" pitchFamily="34" charset="0"/>
+                        <a:cs typeface="Arial" panose="020B0604020202020204" pitchFamily="34" charset="0"/>
+                      </a:endParaRPr>
+                    </a:p>
+                  </a:txBody>
+                  <a:tcPr anchor="ctr"/>
+                </a:tc>
+                <a:tc>
+                  <a:txBody>
+                    <a:bodyPr/>
+                    <a:lstStyle/>
+                    <a:p>
+                      <a:pPr algn="ctr"/>
+                      <a:r>
+                        <a:rPr lang="en-GB" dirty="0" smtClean="0">
+                          <a:latin typeface="Arial" panose="020B0604020202020204" pitchFamily="34" charset="0"/>
+                          <a:cs typeface="Arial" panose="020B0604020202020204" pitchFamily="34" charset="0"/>
+                        </a:rPr>
+                        <a:t>Meters</a:t>
+                      </a:r>
+                      <a:r>
+                        <a:rPr lang="en-GB" baseline="0" dirty="0" smtClean="0">
+                          <a:latin typeface="Arial" panose="020B0604020202020204" pitchFamily="34" charset="0"/>
+                          <a:cs typeface="Arial" panose="020B0604020202020204" pitchFamily="34" charset="0"/>
+                        </a:rPr>
+                        <a:t> Drilled</a:t>
+                      </a:r>
+                      <a:endParaRPr lang="en-GB" dirty="0">
+                        <a:latin typeface="Arial" panose="020B0604020202020204" pitchFamily="34" charset="0"/>
+                        <a:cs typeface="Arial" panose="020B0604020202020204" pitchFamily="34" charset="0"/>
+                      </a:endParaRPr>
+                    </a:p>
+                  </a:txBody>
+                  <a:tcPr anchor="ctr"/>
+                </a:tc>
+                <a:tc>
+                  <a:txBody>
+                    <a:bodyPr/>
+                    <a:lstStyle/>
+                    <a:p>
+                      <a:pPr algn="ctr"/>
+                      <a:r>
+                        <a:rPr lang="en-GB" dirty="0" smtClean="0">
+                          <a:latin typeface="Arial" panose="020B0604020202020204" pitchFamily="34" charset="0"/>
+                          <a:cs typeface="Arial" panose="020B0604020202020204" pitchFamily="34" charset="0"/>
+                        </a:rPr>
+                        <a:t>Score</a:t>
+                      </a:r>
+                      <a:endParaRPr lang="en-GB" dirty="0">
+                        <a:latin typeface="Arial" panose="020B0604020202020204" pitchFamily="34" charset="0"/>
+                        <a:cs typeface="Arial" panose="020B0604020202020204" pitchFamily="34" charset="0"/>
+                      </a:endParaRPr>
+                    </a:p>
+                  </a:txBody>
+                  <a:tcPr anchor="ctr"/>
+                </a:tc>
+                <a:extLst>
+                  <a:ext uri="{0D108BD9-81ED-4DB2-BD59-A6C34878D82A}">
+                    <a16:rowId xmlns:a16="http://schemas.microsoft.com/office/drawing/2014/main" val="2295478800"/>
+                  </a:ext>
+                </a:extLst>
+              </a:tr>
+              <a:tr h="370840">
+                <a:tc>
+                  <a:txBody>
+                    <a:bodyPr/>
+                    <a:lstStyle/>
+                    <a:p>
+                      <a:endParaRPr lang="en-GB" dirty="0">
+                        <a:latin typeface="Arial" panose="020B0604020202020204" pitchFamily="34" charset="0"/>
+                        <a:cs typeface="Arial" panose="020B0604020202020204" pitchFamily="34" charset="0"/>
+                      </a:endParaRPr>
+                    </a:p>
+                  </a:txBody>
+                  <a:tcPr/>
+                </a:tc>
+                <a:tc>
+                  <a:txBody>
+                    <a:bodyPr/>
+                    <a:lstStyle/>
+                    <a:p>
+                      <a:pPr algn="ctr"/>
+                      <a:r>
+                        <a:rPr lang="en-GB" dirty="0" smtClean="0">
+                          <a:latin typeface="Arial" panose="020B0604020202020204" pitchFamily="34" charset="0"/>
+                          <a:cs typeface="Arial" panose="020B0604020202020204" pitchFamily="34" charset="0"/>
+                        </a:rPr>
+                        <a:t>Sandstone</a:t>
+                      </a:r>
+                      <a:endParaRPr lang="en-GB" dirty="0">
+                        <a:latin typeface="Arial" panose="020B0604020202020204" pitchFamily="34" charset="0"/>
+                        <a:cs typeface="Arial" panose="020B0604020202020204" pitchFamily="34" charset="0"/>
+                      </a:endParaRPr>
+                    </a:p>
+                  </a:txBody>
+                  <a:tcPr anchor="ctr"/>
+                </a:tc>
+                <a:tc>
+                  <a:txBody>
+                    <a:bodyPr/>
+                    <a:lstStyle/>
+                    <a:p>
+                      <a:pPr algn="ctr"/>
+                      <a:r>
+                        <a:rPr lang="en-GB" dirty="0" smtClean="0">
+                          <a:latin typeface="Arial" panose="020B0604020202020204" pitchFamily="34" charset="0"/>
+                          <a:cs typeface="Arial" panose="020B0604020202020204" pitchFamily="34" charset="0"/>
+                        </a:rPr>
+                        <a:t>10</a:t>
+                      </a:r>
+                    </a:p>
+                  </a:txBody>
+                  <a:tcPr anchor="ctr"/>
+                </a:tc>
+                <a:tc>
+                  <a:txBody>
+                    <a:bodyPr/>
+                    <a:lstStyle/>
+                    <a:p>
+                      <a:pPr algn="ctr"/>
+                      <a:endParaRPr lang="en-GB" dirty="0">
+                        <a:latin typeface="Arial" panose="020B0604020202020204" pitchFamily="34" charset="0"/>
+                        <a:cs typeface="Arial" panose="020B0604020202020204" pitchFamily="34" charset="0"/>
+                      </a:endParaRPr>
+                    </a:p>
+                  </a:txBody>
+                  <a:tcPr anchor="ctr"/>
+                </a:tc>
+                <a:tc>
+                  <a:txBody>
+                    <a:bodyPr/>
+                    <a:lstStyle/>
+                    <a:p>
+                      <a:pPr algn="ctr"/>
+                      <a:endParaRPr lang="en-GB" dirty="0">
+                        <a:latin typeface="Arial" panose="020B0604020202020204" pitchFamily="34" charset="0"/>
+                        <a:cs typeface="Arial" panose="020B0604020202020204" pitchFamily="34" charset="0"/>
+                      </a:endParaRPr>
+                    </a:p>
+                  </a:txBody>
+                  <a:tcPr anchor="ctr"/>
+                </a:tc>
+                <a:extLst>
+                  <a:ext uri="{0D108BD9-81ED-4DB2-BD59-A6C34878D82A}">
+                    <a16:rowId xmlns:a16="http://schemas.microsoft.com/office/drawing/2014/main" val="1777024265"/>
+                  </a:ext>
+                </a:extLst>
+              </a:tr>
+              <a:tr h="370840">
+                <a:tc>
+                  <a:txBody>
+                    <a:bodyPr/>
+                    <a:lstStyle/>
+                    <a:p>
+                      <a:endParaRPr lang="en-GB" dirty="0">
+                        <a:latin typeface="Arial" panose="020B0604020202020204" pitchFamily="34" charset="0"/>
+                        <a:cs typeface="Arial" panose="020B0604020202020204" pitchFamily="34" charset="0"/>
+                      </a:endParaRPr>
+                    </a:p>
+                  </a:txBody>
+                  <a:tcPr/>
+                </a:tc>
+                <a:tc>
+                  <a:txBody>
+                    <a:bodyPr/>
+                    <a:lstStyle/>
+                    <a:p>
+                      <a:pPr algn="ctr"/>
+                      <a:r>
+                        <a:rPr lang="en-GB" dirty="0" smtClean="0">
+                          <a:latin typeface="Arial" panose="020B0604020202020204" pitchFamily="34" charset="0"/>
+                          <a:cs typeface="Arial" panose="020B0604020202020204" pitchFamily="34" charset="0"/>
+                        </a:rPr>
+                        <a:t>Limestone</a:t>
+                      </a:r>
+                      <a:endParaRPr lang="en-GB" dirty="0">
+                        <a:latin typeface="Arial" panose="020B0604020202020204" pitchFamily="34" charset="0"/>
+                        <a:cs typeface="Arial" panose="020B0604020202020204" pitchFamily="34" charset="0"/>
+                      </a:endParaRPr>
+                    </a:p>
+                  </a:txBody>
+                  <a:tcPr anchor="ctr"/>
+                </a:tc>
+                <a:tc>
+                  <a:txBody>
+                    <a:bodyPr/>
+                    <a:lstStyle/>
+                    <a:p>
+                      <a:pPr algn="ctr"/>
+                      <a:r>
+                        <a:rPr lang="en-GB" dirty="0" smtClean="0">
+                          <a:latin typeface="Arial" panose="020B0604020202020204" pitchFamily="34" charset="0"/>
+                          <a:cs typeface="Arial" panose="020B0604020202020204" pitchFamily="34" charset="0"/>
+                        </a:rPr>
+                        <a:t>30</a:t>
+                      </a:r>
+                    </a:p>
+                  </a:txBody>
+                  <a:tcPr anchor="ctr"/>
+                </a:tc>
+                <a:tc>
+                  <a:txBody>
+                    <a:bodyPr/>
+                    <a:lstStyle/>
+                    <a:p>
+                      <a:pPr algn="ctr"/>
+                      <a:endParaRPr lang="en-GB" dirty="0">
+                        <a:latin typeface="Arial" panose="020B0604020202020204" pitchFamily="34" charset="0"/>
+                        <a:cs typeface="Arial" panose="020B0604020202020204" pitchFamily="34" charset="0"/>
+                      </a:endParaRPr>
+                    </a:p>
+                  </a:txBody>
+                  <a:tcPr anchor="ctr"/>
+                </a:tc>
+                <a:tc>
+                  <a:txBody>
+                    <a:bodyPr/>
+                    <a:lstStyle/>
+                    <a:p>
+                      <a:pPr algn="ctr"/>
+                      <a:endParaRPr lang="en-GB" dirty="0">
+                        <a:latin typeface="Arial" panose="020B0604020202020204" pitchFamily="34" charset="0"/>
+                        <a:cs typeface="Arial" panose="020B0604020202020204" pitchFamily="34" charset="0"/>
+                      </a:endParaRPr>
+                    </a:p>
+                  </a:txBody>
+                  <a:tcPr anchor="ctr"/>
+                </a:tc>
+                <a:extLst>
+                  <a:ext uri="{0D108BD9-81ED-4DB2-BD59-A6C34878D82A}">
+                    <a16:rowId xmlns:a16="http://schemas.microsoft.com/office/drawing/2014/main" val="3913702314"/>
+                  </a:ext>
+                </a:extLst>
+              </a:tr>
+              <a:tr h="370840">
+                <a:tc>
+                  <a:txBody>
+                    <a:bodyPr/>
+                    <a:lstStyle/>
+                    <a:p>
+                      <a:endParaRPr lang="en-GB" dirty="0">
+                        <a:latin typeface="Arial" panose="020B0604020202020204" pitchFamily="34" charset="0"/>
+                        <a:cs typeface="Arial" panose="020B0604020202020204" pitchFamily="34" charset="0"/>
+                      </a:endParaRPr>
+                    </a:p>
+                  </a:txBody>
+                  <a:tcPr/>
+                </a:tc>
+                <a:tc>
+                  <a:txBody>
+                    <a:bodyPr/>
+                    <a:lstStyle/>
+                    <a:p>
+                      <a:pPr algn="ctr"/>
+                      <a:r>
+                        <a:rPr lang="en-GB" dirty="0" smtClean="0">
+                          <a:latin typeface="Arial" panose="020B0604020202020204" pitchFamily="34" charset="0"/>
+                          <a:cs typeface="Arial" panose="020B0604020202020204" pitchFamily="34" charset="0"/>
+                        </a:rPr>
+                        <a:t>Shales</a:t>
+                      </a:r>
+                      <a:endParaRPr lang="en-GB" dirty="0">
+                        <a:latin typeface="Arial" panose="020B0604020202020204" pitchFamily="34" charset="0"/>
+                        <a:cs typeface="Arial" panose="020B0604020202020204" pitchFamily="34" charset="0"/>
+                      </a:endParaRPr>
+                    </a:p>
+                  </a:txBody>
+                  <a:tcPr anchor="ctr"/>
+                </a:tc>
+                <a:tc>
+                  <a:txBody>
+                    <a:bodyPr/>
+                    <a:lstStyle/>
+                    <a:p>
+                      <a:pPr algn="ctr"/>
+                      <a:r>
+                        <a:rPr lang="en-GB" dirty="0" smtClean="0">
+                          <a:latin typeface="Arial" panose="020B0604020202020204" pitchFamily="34" charset="0"/>
+                          <a:cs typeface="Arial" panose="020B0604020202020204" pitchFamily="34" charset="0"/>
+                        </a:rPr>
+                        <a:t>50</a:t>
+                      </a:r>
+                    </a:p>
+                  </a:txBody>
+                  <a:tcPr anchor="ctr"/>
+                </a:tc>
+                <a:tc>
+                  <a:txBody>
+                    <a:bodyPr/>
+                    <a:lstStyle/>
+                    <a:p>
+                      <a:pPr algn="ctr"/>
+                      <a:endParaRPr lang="en-GB" dirty="0">
+                        <a:latin typeface="Arial" panose="020B0604020202020204" pitchFamily="34" charset="0"/>
+                        <a:cs typeface="Arial" panose="020B0604020202020204" pitchFamily="34" charset="0"/>
+                      </a:endParaRPr>
+                    </a:p>
+                  </a:txBody>
+                  <a:tcPr anchor="ctr"/>
+                </a:tc>
+                <a:tc>
+                  <a:txBody>
+                    <a:bodyPr/>
+                    <a:lstStyle/>
+                    <a:p>
+                      <a:pPr algn="ctr"/>
+                      <a:endParaRPr lang="en-GB" dirty="0">
+                        <a:latin typeface="Arial" panose="020B0604020202020204" pitchFamily="34" charset="0"/>
+                        <a:cs typeface="Arial" panose="020B0604020202020204" pitchFamily="34" charset="0"/>
+                      </a:endParaRPr>
+                    </a:p>
+                  </a:txBody>
+                  <a:tcPr anchor="ctr"/>
+                </a:tc>
+                <a:extLst>
+                  <a:ext uri="{0D108BD9-81ED-4DB2-BD59-A6C34878D82A}">
+                    <a16:rowId xmlns:a16="http://schemas.microsoft.com/office/drawing/2014/main" val="2527009210"/>
+                  </a:ext>
+                </a:extLst>
+              </a:tr>
+              <a:tr h="370840">
+                <a:tc>
+                  <a:txBody>
+                    <a:bodyPr/>
+                    <a:lstStyle/>
+                    <a:p>
+                      <a:endParaRPr lang="en-GB" dirty="0">
+                        <a:latin typeface="Arial" panose="020B0604020202020204" pitchFamily="34" charset="0"/>
+                        <a:cs typeface="Arial" panose="020B0604020202020204" pitchFamily="34" charset="0"/>
+                      </a:endParaRPr>
+                    </a:p>
+                  </a:txBody>
+                  <a:tcPr/>
+                </a:tc>
+                <a:tc>
+                  <a:txBody>
+                    <a:bodyPr/>
+                    <a:lstStyle/>
+                    <a:p>
+                      <a:pPr algn="ctr"/>
+                      <a:r>
+                        <a:rPr lang="en-GB" dirty="0" smtClean="0">
+                          <a:latin typeface="Arial" panose="020B0604020202020204" pitchFamily="34" charset="0"/>
+                          <a:cs typeface="Arial" panose="020B0604020202020204" pitchFamily="34" charset="0"/>
+                        </a:rPr>
+                        <a:t>Salt</a:t>
+                      </a:r>
+                      <a:endParaRPr lang="en-GB" dirty="0">
+                        <a:latin typeface="Arial" panose="020B0604020202020204" pitchFamily="34" charset="0"/>
+                        <a:cs typeface="Arial" panose="020B0604020202020204" pitchFamily="34" charset="0"/>
+                      </a:endParaRPr>
+                    </a:p>
+                  </a:txBody>
+                  <a:tcPr anchor="ctr"/>
+                </a:tc>
+                <a:tc>
+                  <a:txBody>
+                    <a:bodyPr/>
+                    <a:lstStyle/>
+                    <a:p>
+                      <a:pPr algn="ctr"/>
+                      <a:r>
+                        <a:rPr lang="en-GB" dirty="0" smtClean="0">
+                          <a:latin typeface="Arial" panose="020B0604020202020204" pitchFamily="34" charset="0"/>
+                          <a:cs typeface="Arial" panose="020B0604020202020204" pitchFamily="34" charset="0"/>
+                        </a:rPr>
+                        <a:t>80</a:t>
+                      </a:r>
+                    </a:p>
+                  </a:txBody>
+                  <a:tcPr anchor="ctr"/>
+                </a:tc>
+                <a:tc>
+                  <a:txBody>
+                    <a:bodyPr/>
+                    <a:lstStyle/>
+                    <a:p>
+                      <a:pPr algn="ctr"/>
+                      <a:endParaRPr lang="en-GB" dirty="0">
+                        <a:latin typeface="Arial" panose="020B0604020202020204" pitchFamily="34" charset="0"/>
+                        <a:cs typeface="Arial" panose="020B0604020202020204" pitchFamily="34" charset="0"/>
+                      </a:endParaRPr>
+                    </a:p>
+                  </a:txBody>
+                  <a:tcPr anchor="ctr"/>
+                </a:tc>
+                <a:tc>
+                  <a:txBody>
+                    <a:bodyPr/>
+                    <a:lstStyle/>
+                    <a:p>
+                      <a:pPr algn="ctr"/>
+                      <a:endParaRPr lang="en-GB" dirty="0">
+                        <a:latin typeface="Arial" panose="020B0604020202020204" pitchFamily="34" charset="0"/>
+                        <a:cs typeface="Arial" panose="020B0604020202020204" pitchFamily="34" charset="0"/>
+                      </a:endParaRPr>
+                    </a:p>
+                  </a:txBody>
+                  <a:tcPr anchor="ctr"/>
+                </a:tc>
+                <a:extLst>
+                  <a:ext uri="{0D108BD9-81ED-4DB2-BD59-A6C34878D82A}">
+                    <a16:rowId xmlns:a16="http://schemas.microsoft.com/office/drawing/2014/main" val="2661287213"/>
+                  </a:ext>
+                </a:extLst>
+              </a:tr>
+            </a:tbl>
+          </a:graphicData>
+        </a:graphic>
+      </p:graphicFrame>
+    </p:spTree>
+    <p:extLst>
+      <p:ext uri="{BB962C8B-B14F-4D97-AF65-F5344CB8AC3E}">
+        <p14:creationId xmlns:p14="http://schemas.microsoft.com/office/powerpoint/2010/main" val="371862595"/>
+      </p:ext>
+    </p:extLst>
+  </p:cSld>
+  <p:clrMapOvr>
+    <a:masterClrMapping/>
+  </p:clrMapOvr>
+</p:sld>
+</file>
+
+<file path=ppt/slides/slide11.xml><?xml version="1.0" encoding="utf-8"?>
+<p:sld xmlns:a="http://schemas.openxmlformats.org/drawingml/2006/main" xmlns:r="http://schemas.openxmlformats.org/officeDocument/2006/relationships" xmlns:p="http://schemas.openxmlformats.org/presentationml/2006/main">
+  <p:cSld>
+    <p:spTree>
+      <p:nvGrpSpPr>
+        <p:cNvPr id="1" name=""/>
+        <p:cNvGrpSpPr/>
+        <p:nvPr/>
+      </p:nvGrpSpPr>
+      <p:grpSpPr>
+        <a:xfrm>
+          <a:off x="0" y="0"/>
+          <a:ext cx="0" cy="0"/>
+          <a:chOff x="0" y="0"/>
+          <a:chExt cx="0" cy="0"/>
+        </a:xfrm>
+      </p:grpSpPr>
+      <p:sp>
+        <p:nvSpPr>
+          <p:cNvPr id="2" name="Title 1"/>
+          <p:cNvSpPr>
+            <a:spLocks noGrp="1"/>
+          </p:cNvSpPr>
+          <p:nvPr>
             <p:ph type="ctrTitle"/>
           </p:nvPr>
         </p:nvSpPr>
@@ -7048,7 +7771,7 @@
 </p:sld>
 </file>
 
-<file path=ppt/slides/slide11.xml><?xml version="1.0" encoding="utf-8"?>
+<file path=ppt/slides/slide12.xml><?xml version="1.0" encoding="utf-8"?>
 <p:sld xmlns:a="http://schemas.openxmlformats.org/drawingml/2006/main" xmlns:r="http://schemas.openxmlformats.org/officeDocument/2006/relationships" xmlns:p="http://schemas.openxmlformats.org/presentationml/2006/main">
   <p:cSld>
     <p:spTree>
@@ -7112,7 +7835,7 @@
           <a:p>
             <a:fld id="{75468FE7-8C63-4358-B16F-C9D145C2ECC7}" type="slidenum">
               <a:rPr lang="en-GB" smtClean="0"/>
-              <a:t>11</a:t>
+              <a:t>12</a:t>
             </a:fld>
             <a:endParaRPr lang="en-GB"/>
           </a:p>
@@ -7578,14 +8301,14 @@
           <p:nvPr>
             <p:extLst>
               <p:ext uri="{D42A27DB-BD31-4B8C-83A1-F6EECF244321}">
-                <p14:modId xmlns:p14="http://schemas.microsoft.com/office/powerpoint/2010/main" val="3697154179"/>
+                <p14:modId xmlns:p14="http://schemas.microsoft.com/office/powerpoint/2010/main" val="1361315509"/>
               </p:ext>
             </p:extLst>
           </p:nvPr>
         </p:nvGraphicFramePr>
         <p:xfrm>
-          <a:off x="2938145" y="5524977"/>
-          <a:ext cx="5443102" cy="741680"/>
+          <a:off x="2566940" y="5154137"/>
+          <a:ext cx="7058120" cy="741680"/>
         </p:xfrm>
         <a:graphic>
           <a:graphicData uri="http://schemas.openxmlformats.org/drawingml/2006/table">
@@ -7594,35 +8317,42 @@
                 <a:tableStyleId>{93296810-A885-4BE3-A3E7-6D5BEEA58F35}</a:tableStyleId>
               </a:tblPr>
               <a:tblGrid>
-                <a:gridCol w="1397953">
+                <a:gridCol w="1462426">
                   <a:extLst>
                     <a:ext uri="{9D8B030D-6E8A-4147-A177-3AD203B41FA5}">
                       <a16:colId xmlns:a16="http://schemas.microsoft.com/office/drawing/2014/main" val="2951334863"/>
                     </a:ext>
                   </a:extLst>
                 </a:gridCol>
-                <a:gridCol w="1198880">
+                <a:gridCol w="1254173">
                   <a:extLst>
                     <a:ext uri="{9D8B030D-6E8A-4147-A177-3AD203B41FA5}">
                       <a16:colId xmlns:a16="http://schemas.microsoft.com/office/drawing/2014/main" val="998366240"/>
                     </a:ext>
                   </a:extLst>
                 </a:gridCol>
-                <a:gridCol w="1071880">
+                <a:gridCol w="1121316">
                   <a:extLst>
                     <a:ext uri="{9D8B030D-6E8A-4147-A177-3AD203B41FA5}">
                       <a16:colId xmlns:a16="http://schemas.microsoft.com/office/drawing/2014/main" val="1910192795"/>
                     </a:ext>
                   </a:extLst>
                 </a:gridCol>
-                <a:gridCol w="868680">
+                <a:gridCol w="1363980">
+                  <a:extLst>
+                    <a:ext uri="{9D8B030D-6E8A-4147-A177-3AD203B41FA5}">
+                      <a16:colId xmlns:a16="http://schemas.microsoft.com/office/drawing/2014/main" val="228434194"/>
+                    </a:ext>
+                  </a:extLst>
+                </a:gridCol>
+                <a:gridCol w="908744">
                   <a:extLst>
                     <a:ext uri="{9D8B030D-6E8A-4147-A177-3AD203B41FA5}">
                       <a16:colId xmlns:a16="http://schemas.microsoft.com/office/drawing/2014/main" val="2200037103"/>
                     </a:ext>
                   </a:extLst>
                 </a:gridCol>
-                <a:gridCol w="905709">
+                <a:gridCol w="947481">
                   <a:extLst>
                     <a:ext uri="{9D8B030D-6E8A-4147-A177-3AD203B41FA5}">
                       <a16:colId xmlns:a16="http://schemas.microsoft.com/office/drawing/2014/main" val="3699722109"/>
@@ -7685,6 +8415,27 @@
                           <a:cs typeface="Arial" panose="020B0604020202020204" pitchFamily="34" charset="0"/>
                         </a:rPr>
                         <a:t>Easting</a:t>
+                      </a:r>
+                      <a:endParaRPr lang="en-GB" dirty="0">
+                        <a:latin typeface="Arial" panose="020B0604020202020204" pitchFamily="34" charset="0"/>
+                        <a:cs typeface="Arial" panose="020B0604020202020204" pitchFamily="34" charset="0"/>
+                      </a:endParaRPr>
+                    </a:p>
+                  </a:txBody>
+                  <a:tcPr anchor="ctr"/>
+                </a:tc>
+                <a:tc>
+                  <a:txBody>
+                    <a:bodyPr/>
+                    <a:lstStyle/>
+                    <a:p>
+                      <a:pPr algn="ctr"/>
+                      <a:r>
+                        <a:rPr lang="en-GB" dirty="0" smtClean="0">
+                          <a:latin typeface="Arial" panose="020B0604020202020204" pitchFamily="34" charset="0"/>
+                          <a:cs typeface="Arial" panose="020B0604020202020204" pitchFamily="34" charset="0"/>
+                        </a:rPr>
+                        <a:t>Projection</a:t>
                       </a:r>
                       <a:endParaRPr lang="en-GB" dirty="0">
                         <a:latin typeface="Arial" panose="020B0604020202020204" pitchFamily="34" charset="0"/>
@@ -7812,6 +8563,20 @@
                   </a:txBody>
                   <a:tcPr anchor="ctr"/>
                 </a:tc>
+                <a:tc>
+                  <a:txBody>
+                    <a:bodyPr/>
+                    <a:lstStyle/>
+                    <a:p>
+                      <a:pPr algn="ctr"/>
+                      <a:endParaRPr lang="en-GB" dirty="0">
+                        <a:latin typeface="Arial" panose="020B0604020202020204" pitchFamily="34" charset="0"/>
+                        <a:cs typeface="Arial" panose="020B0604020202020204" pitchFamily="34" charset="0"/>
+                      </a:endParaRPr>
+                    </a:p>
+                  </a:txBody>
+                  <a:tcPr anchor="ctr"/>
+                </a:tc>
                 <a:extLst>
                   <a:ext uri="{0D108BD9-81ED-4DB2-BD59-A6C34878D82A}">
                     <a16:rowId xmlns:a16="http://schemas.microsoft.com/office/drawing/2014/main" val="1777024265"/>
@@ -7934,11 +8699,7 @@
             <a:pPr lvl="1"/>
             <a:r>
               <a:rPr lang="en-GB" dirty="0" smtClean="0"/>
-              <a:t>Drilling events: losses (minor or major), stuck pipe, pressure kick, blow out, </a:t>
-            </a:r>
-            <a:r>
-              <a:rPr lang="en-GB" dirty="0" smtClean="0"/>
-              <a:t>pack off, tight spot, </a:t>
+              <a:t>Drilling events: losses (minor or major), stuck pipe, pressure kick, blow out, pack off, tight spot, </a:t>
             </a:r>
             <a:r>
               <a:rPr lang="en-GB" dirty="0" err="1" smtClean="0"/>
@@ -8907,7 +9668,7 @@
         <p:spPr>
           <a:xfrm>
             <a:off x="838200" y="1825625"/>
-            <a:ext cx="5934075" cy="4351338"/>
+            <a:ext cx="10515600" cy="4351338"/>
           </a:xfrm>
         </p:spPr>
         <p:txBody>
@@ -8963,8 +9724,8 @@
         </p:nvGrpSpPr>
         <p:grpSpPr>
           <a:xfrm>
-            <a:off x="7505700" y="1827393"/>
-            <a:ext cx="3771502" cy="1873895"/>
+            <a:off x="400050" y="4086225"/>
+            <a:ext cx="3423601" cy="1701038"/>
             <a:chOff x="1594779" y="1445088"/>
             <a:chExt cx="5010283" cy="2489391"/>
           </a:xfrm>
@@ -9001,7 +9762,7 @@
           <p:spPr>
             <a:xfrm>
               <a:off x="1594779" y="1445088"/>
-              <a:ext cx="2061013" cy="369333"/>
+              <a:ext cx="2714983" cy="495458"/>
             </a:xfrm>
             <a:prstGeom prst="rect">
               <a:avLst/>
@@ -9015,89 +9776,20 @@
             <a:lstStyle/>
             <a:p>
               <a:r>
-                <a:rPr lang="en-GB" b="1" dirty="0" smtClean="0">
+                <a:rPr lang="en-GB" sz="1600" b="1" dirty="0" smtClean="0">
                   <a:latin typeface="Arial" panose="020B0604020202020204" pitchFamily="34" charset="0"/>
                   <a:cs typeface="Arial" panose="020B0604020202020204" pitchFamily="34" charset="0"/>
                 </a:rPr>
-                <a:t>Well CRAIGOW-1</a:t>
+                <a:t>Well </a:t>
               </a:r>
-              <a:endParaRPr lang="en-GB" b="1" dirty="0">
-                <a:latin typeface="Arial" panose="020B0604020202020204" pitchFamily="34" charset="0"/>
-                <a:cs typeface="Arial" panose="020B0604020202020204" pitchFamily="34" charset="0"/>
-              </a:endParaRPr>
-            </a:p>
-          </p:txBody>
-        </p:sp>
-      </p:grpSp>
-      <p:grpSp>
-        <p:nvGrpSpPr>
-          <p:cNvPr id="9" name="Group 8"/>
-          <p:cNvGrpSpPr>
-            <a:grpSpLocks noChangeAspect="1"/>
-          </p:cNvGrpSpPr>
-          <p:nvPr/>
-        </p:nvGrpSpPr>
-        <p:grpSpPr>
-          <a:xfrm>
-            <a:off x="7505700" y="3716613"/>
-            <a:ext cx="3721271" cy="1462834"/>
-            <a:chOff x="7566180" y="2595159"/>
-            <a:chExt cx="4469731" cy="1757054"/>
-          </a:xfrm>
-        </p:grpSpPr>
-        <p:pic>
-          <p:nvPicPr>
-            <p:cNvPr id="6" name="Picture 5"/>
-            <p:cNvPicPr>
-              <a:picLocks noChangeAspect="1"/>
-            </p:cNvPicPr>
-            <p:nvPr/>
-          </p:nvPicPr>
-          <p:blipFill rotWithShape="1">
-            <a:blip r:embed="rId4"/>
-            <a:srcRect l="63241" t="70657" r="29142" b="20481"/>
-            <a:stretch/>
-          </p:blipFill>
-          <p:spPr>
-            <a:xfrm>
-              <a:off x="7794995" y="2964491"/>
-              <a:ext cx="4240916" cy="1387722"/>
-            </a:xfrm>
-            <a:prstGeom prst="rect">
-              <a:avLst/>
-            </a:prstGeom>
-          </p:spPr>
-        </p:pic>
-        <p:sp>
-          <p:nvSpPr>
-            <p:cNvPr id="8" name="TextBox 7"/>
-            <p:cNvSpPr txBox="1"/>
-            <p:nvPr/>
-          </p:nvSpPr>
-          <p:spPr>
-            <a:xfrm>
-              <a:off x="7566180" y="2595159"/>
-              <a:ext cx="1980094" cy="369332"/>
-            </a:xfrm>
-            <a:prstGeom prst="rect">
-              <a:avLst/>
-            </a:prstGeom>
-            <a:noFill/>
-          </p:spPr>
-          <p:txBody>
-            <a:bodyPr wrap="none" rtlCol="0">
-              <a:spAutoFit/>
-            </a:bodyPr>
-            <a:lstStyle/>
-            <a:p>
               <a:r>
-                <a:rPr lang="en-GB" b="1" dirty="0" smtClean="0">
+                <a:rPr lang="en-GB" sz="1600" b="1" dirty="0" smtClean="0">
                   <a:latin typeface="Arial" panose="020B0604020202020204" pitchFamily="34" charset="0"/>
                   <a:cs typeface="Arial" panose="020B0604020202020204" pitchFamily="34" charset="0"/>
                 </a:rPr>
-                <a:t>Well OZDELTA-1</a:t>
+                <a:t>CRAIGOW-1</a:t>
               </a:r>
-              <a:endParaRPr lang="en-GB" b="1" dirty="0">
+              <a:endParaRPr lang="en-GB" sz="1600" b="1" dirty="0">
                 <a:latin typeface="Arial" panose="020B0604020202020204" pitchFamily="34" charset="0"/>
                 <a:cs typeface="Arial" panose="020B0604020202020204" pitchFamily="34" charset="0"/>
               </a:endParaRPr>
@@ -9107,21 +9799,21 @@
       </p:grpSp>
       <p:pic>
         <p:nvPicPr>
-          <p:cNvPr id="12" name="Picture 11"/>
+          <p:cNvPr id="3" name="Picture 2"/>
           <p:cNvPicPr>
             <a:picLocks noChangeAspect="1"/>
           </p:cNvPicPr>
           <p:nvPr/>
         </p:nvPicPr>
         <p:blipFill rotWithShape="1">
-          <a:blip r:embed="rId5"/>
-          <a:srcRect l="63209" t="76034" r="20383" b="15202"/>
+          <a:blip r:embed="rId4"/>
+          <a:srcRect l="62679" t="59576" r="16307" b="15322"/>
           <a:stretch/>
         </p:blipFill>
         <p:spPr>
           <a:xfrm>
-            <a:off x="1310489" y="5201003"/>
-            <a:ext cx="8076802" cy="1213317"/>
+            <a:off x="4088874" y="3676650"/>
+            <a:ext cx="7975673" cy="2679700"/>
           </a:xfrm>
           <a:prstGeom prst="rect">
             <a:avLst/>
@@ -9165,14 +9857,14 @@
           <p:nvPr>
             <p:extLst>
               <p:ext uri="{D42A27DB-BD31-4B8C-83A1-F6EECF244321}">
-                <p14:modId xmlns:p14="http://schemas.microsoft.com/office/powerpoint/2010/main" val="974570827"/>
+                <p14:modId xmlns:p14="http://schemas.microsoft.com/office/powerpoint/2010/main" val="2436688748"/>
               </p:ext>
             </p:extLst>
           </p:nvPr>
         </p:nvGraphicFramePr>
         <p:xfrm>
-          <a:off x="1181100" y="514869"/>
-          <a:ext cx="9905999" cy="5030787"/>
+          <a:off x="1181100" y="248169"/>
+          <a:ext cx="10563225" cy="5847041"/>
         </p:xfrm>
         <a:graphic>
           <a:graphicData uri="http://schemas.openxmlformats.org/drawingml/2006/diagram">
@@ -9197,7 +9889,11 @@
           <a:p>
             <a:r>
               <a:rPr lang="en-GB" dirty="0" smtClean="0"/>
-              <a:t>Proof of concept</a:t>
+              <a:t>Proof of </a:t>
+            </a:r>
+            <a:r>
+              <a:rPr lang="en-GB" dirty="0" smtClean="0"/>
+              <a:t>concept </a:t>
             </a:r>
             <a:br>
               <a:rPr lang="en-GB" dirty="0" smtClean="0"/>
@@ -9235,64 +9931,6 @@
       </p:sp>
       <p:pic>
         <p:nvPicPr>
-          <p:cNvPr id="5" name="Picture 4"/>
-          <p:cNvPicPr>
-            <a:picLocks noChangeAspect="1"/>
-          </p:cNvPicPr>
-          <p:nvPr/>
-        </p:nvPicPr>
-        <p:blipFill rotWithShape="1">
-          <a:blip r:embed="rId8">
-            <a:extLst>
-              <a:ext uri="{28A0092B-C50C-407E-A947-70E740481C1C}">
-                <a14:useLocalDpi xmlns:a14="http://schemas.microsoft.com/office/drawing/2010/main" val="0"/>
-              </a:ext>
-            </a:extLst>
-          </a:blip>
-          <a:srcRect l="12900" t="4722" r="11529" b="11528"/>
-          <a:stretch/>
-        </p:blipFill>
-        <p:spPr>
-          <a:xfrm>
-            <a:off x="1270584" y="4345781"/>
-            <a:ext cx="2800622" cy="2187533"/>
-          </a:xfrm>
-          <a:prstGeom prst="rect">
-            <a:avLst/>
-          </a:prstGeom>
-        </p:spPr>
-      </p:pic>
-      <p:pic>
-        <p:nvPicPr>
-          <p:cNvPr id="11" name="Picture 10"/>
-          <p:cNvPicPr>
-            <a:picLocks noChangeAspect="1"/>
-          </p:cNvPicPr>
-          <p:nvPr/>
-        </p:nvPicPr>
-        <p:blipFill rotWithShape="1">
-          <a:blip r:embed="rId9">
-            <a:extLst>
-              <a:ext uri="{28A0092B-C50C-407E-A947-70E740481C1C}">
-                <a14:useLocalDpi xmlns:a14="http://schemas.microsoft.com/office/drawing/2010/main" val="0"/>
-              </a:ext>
-            </a:extLst>
-          </a:blip>
-          <a:srcRect l="24492" t="32922" r="31716" b="19115"/>
-          <a:stretch/>
-        </p:blipFill>
-        <p:spPr>
-          <a:xfrm>
-            <a:off x="4592055" y="4345781"/>
-            <a:ext cx="3222493" cy="2185689"/>
-          </a:xfrm>
-          <a:prstGeom prst="rect">
-            <a:avLst/>
-          </a:prstGeom>
-        </p:spPr>
-      </p:pic>
-      <p:pic>
-        <p:nvPicPr>
           <p:cNvPr id="12" name="Picture 11"/>
           <p:cNvPicPr>
             <a:picLocks noChangeAspect="1"/>
@@ -9300,7 +9938,7 @@
           <p:nvPr/>
         </p:nvPicPr>
         <p:blipFill>
-          <a:blip r:embed="rId10">
+          <a:blip r:embed="rId8">
             <a:extLst>
               <a:ext uri="{28A0092B-C50C-407E-A947-70E740481C1C}">
                 <a14:useLocalDpi xmlns:a14="http://schemas.microsoft.com/office/drawing/2010/main" val="0"/>
@@ -9313,8 +9951,38 @@
         </p:blipFill>
         <p:spPr>
           <a:xfrm>
-            <a:off x="8221076" y="4416914"/>
+            <a:off x="6718151" y="4678054"/>
             <a:ext cx="3264049" cy="2043421"/>
+          </a:xfrm>
+          <a:prstGeom prst="rect">
+            <a:avLst/>
+          </a:prstGeom>
+        </p:spPr>
+      </p:pic>
+      <p:pic>
+        <p:nvPicPr>
+          <p:cNvPr id="10" name="Picture 9"/>
+          <p:cNvPicPr>
+            <a:picLocks noChangeAspect="1"/>
+          </p:cNvPicPr>
+          <p:nvPr/>
+        </p:nvPicPr>
+        <p:blipFill>
+          <a:blip r:embed="rId9" cstate="hqprint">
+            <a:extLst>
+              <a:ext uri="{28A0092B-C50C-407E-A947-70E740481C1C}">
+                <a14:useLocalDpi xmlns:a14="http://schemas.microsoft.com/office/drawing/2010/main" val="0"/>
+              </a:ext>
+            </a:extLst>
+          </a:blip>
+          <a:stretch>
+            <a:fillRect/>
+          </a:stretch>
+        </p:blipFill>
+        <p:spPr>
+          <a:xfrm>
+            <a:off x="2212303" y="4519857"/>
+            <a:ext cx="2790825" cy="2046024"/>
           </a:xfrm>
           <a:prstGeom prst="rect">
             <a:avLst/>
@@ -9368,57 +10036,16 @@
           <a:p>
             <a:r>
               <a:rPr lang="en-GB" dirty="0" smtClean="0"/>
-              <a:t>Next Step</a:t>
+              <a:t>Proof of concept </a:t>
             </a:r>
             <a:br>
               <a:rPr lang="en-GB" dirty="0" smtClean="0"/>
             </a:br>
             <a:r>
               <a:rPr lang="en-GB" dirty="0" smtClean="0"/>
-              <a:t>Focus on Formation</a:t>
+              <a:t>Visualisation</a:t>
             </a:r>
             <a:endParaRPr lang="en-GB" dirty="0"/>
-          </a:p>
-        </p:txBody>
-      </p:sp>
-      <p:sp>
-        <p:nvSpPr>
-          <p:cNvPr id="3" name="Content Placeholder 2"/>
-          <p:cNvSpPr>
-            <a:spLocks noGrp="1"/>
-          </p:cNvSpPr>
-          <p:nvPr>
-            <p:ph idx="1"/>
-          </p:nvPr>
-        </p:nvSpPr>
-        <p:spPr>
-          <a:xfrm>
-            <a:off x="838200" y="1825625"/>
-            <a:ext cx="10252295" cy="4351338"/>
-          </a:xfrm>
-        </p:spPr>
-        <p:txBody>
-          <a:bodyPr/>
-          <a:lstStyle/>
-          <a:p>
-            <a:r>
-              <a:rPr lang="en-GB" dirty="0" smtClean="0"/>
-              <a:t>Some formation are more challenging to drill than others due to rock parameters and mechanics (density, cohesion, </a:t>
-            </a:r>
-            <a:r>
-              <a:rPr lang="en-GB" dirty="0" err="1" smtClean="0"/>
-              <a:t>etc</a:t>
-            </a:r>
-            <a:r>
-              <a:rPr lang="en-GB" dirty="0" smtClean="0"/>
-              <a:t> …)</a:t>
-            </a:r>
-          </a:p>
-          <a:p>
-            <a:r>
-              <a:rPr lang="en-GB" dirty="0" smtClean="0"/>
-              <a:t>From the asset specification: get the details of the expected drilled formation (type and meters drilled)</a:t>
-            </a:r>
           </a:p>
         </p:txBody>
       </p:sp>
@@ -9445,538 +10072,307 @@
           </a:p>
         </p:txBody>
       </p:sp>
-      <p:graphicFrame>
-        <p:nvGraphicFramePr>
-          <p:cNvPr id="6" name="Table 5"/>
-          <p:cNvGraphicFramePr>
-            <a:graphicFrameLocks noGrp="1"/>
-          </p:cNvGraphicFramePr>
-          <p:nvPr>
-            <p:extLst>
-              <p:ext uri="{D42A27DB-BD31-4B8C-83A1-F6EECF244321}">
-                <p14:modId xmlns:p14="http://schemas.microsoft.com/office/powerpoint/2010/main" val="2401891432"/>
-              </p:ext>
-            </p:extLst>
-          </p:nvPr>
-        </p:nvGraphicFramePr>
-        <p:xfrm>
-          <a:off x="2240135" y="4131775"/>
-          <a:ext cx="7742065" cy="1854200"/>
-        </p:xfrm>
-        <a:graphic>
-          <a:graphicData uri="http://schemas.openxmlformats.org/drawingml/2006/table">
-            <a:tbl>
-              <a:tblPr firstRow="1" bandRow="1">
-                <a:tableStyleId>{93296810-A885-4BE3-A3E7-6D5BEEA58F35}</a:tableStyleId>
-              </a:tblPr>
-              <a:tblGrid>
-                <a:gridCol w="2411866">
-                  <a:extLst>
-                    <a:ext uri="{9D8B030D-6E8A-4147-A177-3AD203B41FA5}">
-                      <a16:colId xmlns:a16="http://schemas.microsoft.com/office/drawing/2014/main" val="2951334863"/>
-                    </a:ext>
-                  </a:extLst>
-                </a:gridCol>
-                <a:gridCol w="1338580">
-                  <a:extLst>
-                    <a:ext uri="{9D8B030D-6E8A-4147-A177-3AD203B41FA5}">
-                      <a16:colId xmlns:a16="http://schemas.microsoft.com/office/drawing/2014/main" val="998366240"/>
-                    </a:ext>
-                  </a:extLst>
-                </a:gridCol>
-                <a:gridCol w="857752">
-                  <a:extLst>
-                    <a:ext uri="{9D8B030D-6E8A-4147-A177-3AD203B41FA5}">
-                      <a16:colId xmlns:a16="http://schemas.microsoft.com/office/drawing/2014/main" val="1910192795"/>
-                    </a:ext>
-                  </a:extLst>
-                </a:gridCol>
-                <a:gridCol w="2068168">
-                  <a:extLst>
-                    <a:ext uri="{9D8B030D-6E8A-4147-A177-3AD203B41FA5}">
-                      <a16:colId xmlns:a16="http://schemas.microsoft.com/office/drawing/2014/main" val="2200037103"/>
-                    </a:ext>
-                  </a:extLst>
-                </a:gridCol>
-                <a:gridCol w="1065699">
-                  <a:extLst>
-                    <a:ext uri="{9D8B030D-6E8A-4147-A177-3AD203B41FA5}">
-                      <a16:colId xmlns:a16="http://schemas.microsoft.com/office/drawing/2014/main" val="3699722109"/>
-                    </a:ext>
-                  </a:extLst>
-                </a:gridCol>
-              </a:tblGrid>
-              <a:tr h="370840">
-                <a:tc>
-                  <a:txBody>
-                    <a:bodyPr/>
-                    <a:lstStyle/>
-                    <a:p>
-                      <a:pPr algn="ctr"/>
-                      <a:r>
-                        <a:rPr lang="en-GB" dirty="0" smtClean="0">
-                          <a:latin typeface="Arial" panose="020B0604020202020204" pitchFamily="34" charset="0"/>
-                          <a:cs typeface="Arial" panose="020B0604020202020204" pitchFamily="34" charset="0"/>
-                        </a:rPr>
-                        <a:t>Formation Name</a:t>
-                      </a:r>
-                      <a:endParaRPr lang="en-GB" dirty="0">
-                        <a:latin typeface="Arial" panose="020B0604020202020204" pitchFamily="34" charset="0"/>
-                        <a:cs typeface="Arial" panose="020B0604020202020204" pitchFamily="34" charset="0"/>
-                      </a:endParaRPr>
-                    </a:p>
-                  </a:txBody>
-                  <a:tcPr/>
-                </a:tc>
-                <a:tc>
-                  <a:txBody>
-                    <a:bodyPr/>
-                    <a:lstStyle/>
-                    <a:p>
-                      <a:pPr algn="ctr"/>
-                      <a:r>
-                        <a:rPr lang="en-GB" dirty="0" smtClean="0">
-                          <a:latin typeface="Arial" panose="020B0604020202020204" pitchFamily="34" charset="0"/>
-                          <a:cs typeface="Arial" panose="020B0604020202020204" pitchFamily="34" charset="0"/>
-                        </a:rPr>
-                        <a:t>Type</a:t>
-                      </a:r>
-                      <a:endParaRPr lang="en-GB" dirty="0">
-                        <a:latin typeface="Arial" panose="020B0604020202020204" pitchFamily="34" charset="0"/>
-                        <a:cs typeface="Arial" panose="020B0604020202020204" pitchFamily="34" charset="0"/>
-                      </a:endParaRPr>
-                    </a:p>
-                  </a:txBody>
-                  <a:tcPr anchor="ctr"/>
-                </a:tc>
-                <a:tc>
-                  <a:txBody>
-                    <a:bodyPr/>
-                    <a:lstStyle/>
-                    <a:p>
-                      <a:pPr algn="ctr"/>
-                      <a:r>
-                        <a:rPr lang="en-GB" dirty="0" smtClean="0">
-                          <a:latin typeface="Arial" panose="020B0604020202020204" pitchFamily="34" charset="0"/>
-                          <a:cs typeface="Arial" panose="020B0604020202020204" pitchFamily="34" charset="0"/>
-                        </a:rPr>
-                        <a:t>Risk</a:t>
-                      </a:r>
-                      <a:endParaRPr lang="en-GB" dirty="0">
-                        <a:latin typeface="Arial" panose="020B0604020202020204" pitchFamily="34" charset="0"/>
-                        <a:cs typeface="Arial" panose="020B0604020202020204" pitchFamily="34" charset="0"/>
-                      </a:endParaRPr>
-                    </a:p>
-                  </a:txBody>
-                  <a:tcPr anchor="ctr"/>
-                </a:tc>
-                <a:tc>
-                  <a:txBody>
-                    <a:bodyPr/>
-                    <a:lstStyle/>
-                    <a:p>
-                      <a:pPr algn="ctr"/>
-                      <a:r>
-                        <a:rPr lang="en-GB" dirty="0" smtClean="0">
-                          <a:latin typeface="Arial" panose="020B0604020202020204" pitchFamily="34" charset="0"/>
-                          <a:cs typeface="Arial" panose="020B0604020202020204" pitchFamily="34" charset="0"/>
-                        </a:rPr>
-                        <a:t>Meters</a:t>
-                      </a:r>
-                      <a:r>
-                        <a:rPr lang="en-GB" baseline="0" dirty="0" smtClean="0">
-                          <a:latin typeface="Arial" panose="020B0604020202020204" pitchFamily="34" charset="0"/>
-                          <a:cs typeface="Arial" panose="020B0604020202020204" pitchFamily="34" charset="0"/>
-                        </a:rPr>
-                        <a:t> Drilled</a:t>
-                      </a:r>
-                      <a:endParaRPr lang="en-GB" dirty="0">
-                        <a:latin typeface="Arial" panose="020B0604020202020204" pitchFamily="34" charset="0"/>
-                        <a:cs typeface="Arial" panose="020B0604020202020204" pitchFamily="34" charset="0"/>
-                      </a:endParaRPr>
-                    </a:p>
-                  </a:txBody>
-                  <a:tcPr anchor="ctr"/>
-                </a:tc>
-                <a:tc>
-                  <a:txBody>
-                    <a:bodyPr/>
-                    <a:lstStyle/>
-                    <a:p>
-                      <a:pPr algn="ctr"/>
-                      <a:r>
-                        <a:rPr lang="en-GB" dirty="0" smtClean="0">
-                          <a:latin typeface="Arial" panose="020B0604020202020204" pitchFamily="34" charset="0"/>
-                          <a:cs typeface="Arial" panose="020B0604020202020204" pitchFamily="34" charset="0"/>
-                        </a:rPr>
-                        <a:t>Score</a:t>
-                      </a:r>
-                      <a:endParaRPr lang="en-GB" dirty="0">
-                        <a:latin typeface="Arial" panose="020B0604020202020204" pitchFamily="34" charset="0"/>
-                        <a:cs typeface="Arial" panose="020B0604020202020204" pitchFamily="34" charset="0"/>
-                      </a:endParaRPr>
-                    </a:p>
-                  </a:txBody>
-                  <a:tcPr anchor="ctr"/>
-                </a:tc>
-                <a:extLst>
-                  <a:ext uri="{0D108BD9-81ED-4DB2-BD59-A6C34878D82A}">
-                    <a16:rowId xmlns:a16="http://schemas.microsoft.com/office/drawing/2014/main" val="2295478800"/>
-                  </a:ext>
-                </a:extLst>
-              </a:tr>
-              <a:tr h="370840">
-                <a:tc>
-                  <a:txBody>
-                    <a:bodyPr/>
-                    <a:lstStyle/>
-                    <a:p>
-                      <a:endParaRPr lang="en-GB" dirty="0">
-                        <a:latin typeface="Arial" panose="020B0604020202020204" pitchFamily="34" charset="0"/>
-                        <a:cs typeface="Arial" panose="020B0604020202020204" pitchFamily="34" charset="0"/>
-                      </a:endParaRPr>
-                    </a:p>
-                  </a:txBody>
-                  <a:tcPr/>
-                </a:tc>
-                <a:tc>
-                  <a:txBody>
-                    <a:bodyPr/>
-                    <a:lstStyle/>
-                    <a:p>
-                      <a:pPr algn="ctr"/>
-                      <a:r>
-                        <a:rPr lang="en-GB" dirty="0" smtClean="0">
-                          <a:latin typeface="Arial" panose="020B0604020202020204" pitchFamily="34" charset="0"/>
-                          <a:cs typeface="Arial" panose="020B0604020202020204" pitchFamily="34" charset="0"/>
-                        </a:rPr>
-                        <a:t>Sandstone</a:t>
-                      </a:r>
-                      <a:endParaRPr lang="en-GB" dirty="0">
-                        <a:latin typeface="Arial" panose="020B0604020202020204" pitchFamily="34" charset="0"/>
-                        <a:cs typeface="Arial" panose="020B0604020202020204" pitchFamily="34" charset="0"/>
-                      </a:endParaRPr>
-                    </a:p>
-                  </a:txBody>
-                  <a:tcPr anchor="ctr"/>
-                </a:tc>
-                <a:tc>
-                  <a:txBody>
-                    <a:bodyPr/>
-                    <a:lstStyle/>
-                    <a:p>
-                      <a:pPr algn="ctr"/>
-                      <a:r>
-                        <a:rPr lang="en-GB" dirty="0" smtClean="0">
-                          <a:latin typeface="Arial" panose="020B0604020202020204" pitchFamily="34" charset="0"/>
-                          <a:cs typeface="Arial" panose="020B0604020202020204" pitchFamily="34" charset="0"/>
-                        </a:rPr>
-                        <a:t>10</a:t>
-                      </a:r>
-                    </a:p>
-                  </a:txBody>
-                  <a:tcPr anchor="ctr"/>
-                </a:tc>
-                <a:tc>
-                  <a:txBody>
-                    <a:bodyPr/>
-                    <a:lstStyle/>
-                    <a:p>
-                      <a:pPr algn="ctr"/>
-                      <a:endParaRPr lang="en-GB" dirty="0">
-                        <a:latin typeface="Arial" panose="020B0604020202020204" pitchFamily="34" charset="0"/>
-                        <a:cs typeface="Arial" panose="020B0604020202020204" pitchFamily="34" charset="0"/>
-                      </a:endParaRPr>
-                    </a:p>
-                  </a:txBody>
-                  <a:tcPr anchor="ctr"/>
-                </a:tc>
-                <a:tc>
-                  <a:txBody>
-                    <a:bodyPr/>
-                    <a:lstStyle/>
-                    <a:p>
-                      <a:pPr algn="ctr"/>
-                      <a:endParaRPr lang="en-GB" dirty="0">
-                        <a:latin typeface="Arial" panose="020B0604020202020204" pitchFamily="34" charset="0"/>
-                        <a:cs typeface="Arial" panose="020B0604020202020204" pitchFamily="34" charset="0"/>
-                      </a:endParaRPr>
-                    </a:p>
-                  </a:txBody>
-                  <a:tcPr anchor="ctr"/>
-                </a:tc>
-                <a:extLst>
-                  <a:ext uri="{0D108BD9-81ED-4DB2-BD59-A6C34878D82A}">
-                    <a16:rowId xmlns:a16="http://schemas.microsoft.com/office/drawing/2014/main" val="1777024265"/>
-                  </a:ext>
-                </a:extLst>
-              </a:tr>
-              <a:tr h="370840">
-                <a:tc>
-                  <a:txBody>
-                    <a:bodyPr/>
-                    <a:lstStyle/>
-                    <a:p>
-                      <a:endParaRPr lang="en-GB" dirty="0">
-                        <a:latin typeface="Arial" panose="020B0604020202020204" pitchFamily="34" charset="0"/>
-                        <a:cs typeface="Arial" panose="020B0604020202020204" pitchFamily="34" charset="0"/>
-                      </a:endParaRPr>
-                    </a:p>
-                  </a:txBody>
-                  <a:tcPr/>
-                </a:tc>
-                <a:tc>
-                  <a:txBody>
-                    <a:bodyPr/>
-                    <a:lstStyle/>
-                    <a:p>
-                      <a:pPr algn="ctr"/>
-                      <a:r>
-                        <a:rPr lang="en-GB" dirty="0" smtClean="0">
-                          <a:latin typeface="Arial" panose="020B0604020202020204" pitchFamily="34" charset="0"/>
-                          <a:cs typeface="Arial" panose="020B0604020202020204" pitchFamily="34" charset="0"/>
-                        </a:rPr>
-                        <a:t>Limestone</a:t>
-                      </a:r>
-                      <a:endParaRPr lang="en-GB" dirty="0">
-                        <a:latin typeface="Arial" panose="020B0604020202020204" pitchFamily="34" charset="0"/>
-                        <a:cs typeface="Arial" panose="020B0604020202020204" pitchFamily="34" charset="0"/>
-                      </a:endParaRPr>
-                    </a:p>
-                  </a:txBody>
-                  <a:tcPr anchor="ctr"/>
-                </a:tc>
-                <a:tc>
-                  <a:txBody>
-                    <a:bodyPr/>
-                    <a:lstStyle/>
-                    <a:p>
-                      <a:pPr algn="ctr"/>
-                      <a:r>
-                        <a:rPr lang="en-GB" dirty="0" smtClean="0">
-                          <a:latin typeface="Arial" panose="020B0604020202020204" pitchFamily="34" charset="0"/>
-                          <a:cs typeface="Arial" panose="020B0604020202020204" pitchFamily="34" charset="0"/>
-                        </a:rPr>
-                        <a:t>30</a:t>
-                      </a:r>
-                    </a:p>
-                  </a:txBody>
-                  <a:tcPr anchor="ctr"/>
-                </a:tc>
-                <a:tc>
-                  <a:txBody>
-                    <a:bodyPr/>
-                    <a:lstStyle/>
-                    <a:p>
-                      <a:pPr algn="ctr"/>
-                      <a:endParaRPr lang="en-GB" dirty="0">
-                        <a:latin typeface="Arial" panose="020B0604020202020204" pitchFamily="34" charset="0"/>
-                        <a:cs typeface="Arial" panose="020B0604020202020204" pitchFamily="34" charset="0"/>
-                      </a:endParaRPr>
-                    </a:p>
-                  </a:txBody>
-                  <a:tcPr anchor="ctr"/>
-                </a:tc>
-                <a:tc>
-                  <a:txBody>
-                    <a:bodyPr/>
-                    <a:lstStyle/>
-                    <a:p>
-                      <a:pPr algn="ctr"/>
-                      <a:endParaRPr lang="en-GB" dirty="0">
-                        <a:latin typeface="Arial" panose="020B0604020202020204" pitchFamily="34" charset="0"/>
-                        <a:cs typeface="Arial" panose="020B0604020202020204" pitchFamily="34" charset="0"/>
-                      </a:endParaRPr>
-                    </a:p>
-                  </a:txBody>
-                  <a:tcPr anchor="ctr"/>
-                </a:tc>
-                <a:extLst>
-                  <a:ext uri="{0D108BD9-81ED-4DB2-BD59-A6C34878D82A}">
-                    <a16:rowId xmlns:a16="http://schemas.microsoft.com/office/drawing/2014/main" val="3913702314"/>
-                  </a:ext>
-                </a:extLst>
-              </a:tr>
-              <a:tr h="370840">
-                <a:tc>
-                  <a:txBody>
-                    <a:bodyPr/>
-                    <a:lstStyle/>
-                    <a:p>
-                      <a:endParaRPr lang="en-GB" dirty="0">
-                        <a:latin typeface="Arial" panose="020B0604020202020204" pitchFamily="34" charset="0"/>
-                        <a:cs typeface="Arial" panose="020B0604020202020204" pitchFamily="34" charset="0"/>
-                      </a:endParaRPr>
-                    </a:p>
-                  </a:txBody>
-                  <a:tcPr/>
-                </a:tc>
-                <a:tc>
-                  <a:txBody>
-                    <a:bodyPr/>
-                    <a:lstStyle/>
-                    <a:p>
-                      <a:pPr algn="ctr"/>
-                      <a:r>
-                        <a:rPr lang="en-GB" dirty="0" smtClean="0">
-                          <a:latin typeface="Arial" panose="020B0604020202020204" pitchFamily="34" charset="0"/>
-                          <a:cs typeface="Arial" panose="020B0604020202020204" pitchFamily="34" charset="0"/>
-                        </a:rPr>
-                        <a:t>Shales</a:t>
-                      </a:r>
-                      <a:endParaRPr lang="en-GB" dirty="0">
-                        <a:latin typeface="Arial" panose="020B0604020202020204" pitchFamily="34" charset="0"/>
-                        <a:cs typeface="Arial" panose="020B0604020202020204" pitchFamily="34" charset="0"/>
-                      </a:endParaRPr>
-                    </a:p>
-                  </a:txBody>
-                  <a:tcPr anchor="ctr"/>
-                </a:tc>
-                <a:tc>
-                  <a:txBody>
-                    <a:bodyPr/>
-                    <a:lstStyle/>
-                    <a:p>
-                      <a:pPr algn="ctr"/>
-                      <a:r>
-                        <a:rPr lang="en-GB" dirty="0" smtClean="0">
-                          <a:latin typeface="Arial" panose="020B0604020202020204" pitchFamily="34" charset="0"/>
-                          <a:cs typeface="Arial" panose="020B0604020202020204" pitchFamily="34" charset="0"/>
-                        </a:rPr>
-                        <a:t>50</a:t>
-                      </a:r>
-                    </a:p>
-                  </a:txBody>
-                  <a:tcPr anchor="ctr"/>
-                </a:tc>
-                <a:tc>
-                  <a:txBody>
-                    <a:bodyPr/>
-                    <a:lstStyle/>
-                    <a:p>
-                      <a:pPr algn="ctr"/>
-                      <a:endParaRPr lang="en-GB" dirty="0">
-                        <a:latin typeface="Arial" panose="020B0604020202020204" pitchFamily="34" charset="0"/>
-                        <a:cs typeface="Arial" panose="020B0604020202020204" pitchFamily="34" charset="0"/>
-                      </a:endParaRPr>
-                    </a:p>
-                  </a:txBody>
-                  <a:tcPr anchor="ctr"/>
-                </a:tc>
-                <a:tc>
-                  <a:txBody>
-                    <a:bodyPr/>
-                    <a:lstStyle/>
-                    <a:p>
-                      <a:pPr algn="ctr"/>
-                      <a:endParaRPr lang="en-GB" dirty="0">
-                        <a:latin typeface="Arial" panose="020B0604020202020204" pitchFamily="34" charset="0"/>
-                        <a:cs typeface="Arial" panose="020B0604020202020204" pitchFamily="34" charset="0"/>
-                      </a:endParaRPr>
-                    </a:p>
-                  </a:txBody>
-                  <a:tcPr anchor="ctr"/>
-                </a:tc>
-                <a:extLst>
-                  <a:ext uri="{0D108BD9-81ED-4DB2-BD59-A6C34878D82A}">
-                    <a16:rowId xmlns:a16="http://schemas.microsoft.com/office/drawing/2014/main" val="2527009210"/>
-                  </a:ext>
-                </a:extLst>
-              </a:tr>
-              <a:tr h="370840">
-                <a:tc>
-                  <a:txBody>
-                    <a:bodyPr/>
-                    <a:lstStyle/>
-                    <a:p>
-                      <a:endParaRPr lang="en-GB" dirty="0">
-                        <a:latin typeface="Arial" panose="020B0604020202020204" pitchFamily="34" charset="0"/>
-                        <a:cs typeface="Arial" panose="020B0604020202020204" pitchFamily="34" charset="0"/>
-                      </a:endParaRPr>
-                    </a:p>
-                  </a:txBody>
-                  <a:tcPr/>
-                </a:tc>
-                <a:tc>
-                  <a:txBody>
-                    <a:bodyPr/>
-                    <a:lstStyle/>
-                    <a:p>
-                      <a:pPr algn="ctr"/>
-                      <a:r>
-                        <a:rPr lang="en-GB" dirty="0" smtClean="0">
-                          <a:latin typeface="Arial" panose="020B0604020202020204" pitchFamily="34" charset="0"/>
-                          <a:cs typeface="Arial" panose="020B0604020202020204" pitchFamily="34" charset="0"/>
-                        </a:rPr>
-                        <a:t>Salt</a:t>
-                      </a:r>
-                      <a:endParaRPr lang="en-GB" dirty="0">
-                        <a:latin typeface="Arial" panose="020B0604020202020204" pitchFamily="34" charset="0"/>
-                        <a:cs typeface="Arial" panose="020B0604020202020204" pitchFamily="34" charset="0"/>
-                      </a:endParaRPr>
-                    </a:p>
-                  </a:txBody>
-                  <a:tcPr anchor="ctr"/>
-                </a:tc>
-                <a:tc>
-                  <a:txBody>
-                    <a:bodyPr/>
-                    <a:lstStyle/>
-                    <a:p>
-                      <a:pPr algn="ctr"/>
-                      <a:r>
-                        <a:rPr lang="en-GB" dirty="0" smtClean="0">
-                          <a:latin typeface="Arial" panose="020B0604020202020204" pitchFamily="34" charset="0"/>
-                          <a:cs typeface="Arial" panose="020B0604020202020204" pitchFamily="34" charset="0"/>
-                        </a:rPr>
-                        <a:t>80</a:t>
-                      </a:r>
-                    </a:p>
-                  </a:txBody>
-                  <a:tcPr anchor="ctr"/>
-                </a:tc>
-                <a:tc>
-                  <a:txBody>
-                    <a:bodyPr/>
-                    <a:lstStyle/>
-                    <a:p>
-                      <a:pPr algn="ctr"/>
-                      <a:endParaRPr lang="en-GB" dirty="0">
-                        <a:latin typeface="Arial" panose="020B0604020202020204" pitchFamily="34" charset="0"/>
-                        <a:cs typeface="Arial" panose="020B0604020202020204" pitchFamily="34" charset="0"/>
-                      </a:endParaRPr>
-                    </a:p>
-                  </a:txBody>
-                  <a:tcPr anchor="ctr"/>
-                </a:tc>
-                <a:tc>
-                  <a:txBody>
-                    <a:bodyPr/>
-                    <a:lstStyle/>
-                    <a:p>
-                      <a:pPr algn="ctr"/>
-                      <a:endParaRPr lang="en-GB" dirty="0">
-                        <a:latin typeface="Arial" panose="020B0604020202020204" pitchFamily="34" charset="0"/>
-                        <a:cs typeface="Arial" panose="020B0604020202020204" pitchFamily="34" charset="0"/>
-                      </a:endParaRPr>
-                    </a:p>
-                  </a:txBody>
-                  <a:tcPr anchor="ctr"/>
-                </a:tc>
-                <a:extLst>
-                  <a:ext uri="{0D108BD9-81ED-4DB2-BD59-A6C34878D82A}">
-                    <a16:rowId xmlns:a16="http://schemas.microsoft.com/office/drawing/2014/main" val="2661287213"/>
-                  </a:ext>
-                </a:extLst>
-              </a:tr>
-            </a:tbl>
-          </a:graphicData>
-        </a:graphic>
-      </p:graphicFrame>
+      <p:grpSp>
+        <p:nvGrpSpPr>
+          <p:cNvPr id="23" name="Group 22"/>
+          <p:cNvGrpSpPr/>
+          <p:nvPr/>
+        </p:nvGrpSpPr>
+        <p:grpSpPr>
+          <a:xfrm>
+            <a:off x="1524000" y="2003586"/>
+            <a:ext cx="10015233" cy="4260110"/>
+            <a:chOff x="1781175" y="1898811"/>
+            <a:chExt cx="10015233" cy="4260110"/>
+          </a:xfrm>
+        </p:grpSpPr>
+        <p:grpSp>
+          <p:nvGrpSpPr>
+            <p:cNvPr id="20" name="Group 19"/>
+            <p:cNvGrpSpPr/>
+            <p:nvPr/>
+          </p:nvGrpSpPr>
+          <p:grpSpPr>
+            <a:xfrm>
+              <a:off x="1781175" y="1898811"/>
+              <a:ext cx="10015233" cy="4260110"/>
+              <a:chOff x="1781175" y="1898811"/>
+              <a:chExt cx="10015233" cy="4260110"/>
+            </a:xfrm>
+          </p:grpSpPr>
+          <p:grpSp>
+            <p:nvGrpSpPr>
+              <p:cNvPr id="15" name="Group 14"/>
+              <p:cNvGrpSpPr/>
+              <p:nvPr/>
+            </p:nvGrpSpPr>
+            <p:grpSpPr>
+              <a:xfrm>
+                <a:off x="1781175" y="1898811"/>
+                <a:ext cx="3495674" cy="3513613"/>
+                <a:chOff x="1781175" y="1898811"/>
+                <a:chExt cx="3495674" cy="3513613"/>
+              </a:xfrm>
+            </p:grpSpPr>
+            <p:grpSp>
+              <p:nvGrpSpPr>
+                <p:cNvPr id="5" name="Group 4"/>
+                <p:cNvGrpSpPr>
+                  <a:grpSpLocks noChangeAspect="1"/>
+                </p:cNvGrpSpPr>
+                <p:nvPr/>
+              </p:nvGrpSpPr>
+              <p:grpSpPr>
+                <a:xfrm>
+                  <a:off x="1781175" y="2897824"/>
+                  <a:ext cx="2588019" cy="2514600"/>
+                  <a:chOff x="1676399" y="4021656"/>
+                  <a:chExt cx="2588019" cy="2514600"/>
+                </a:xfrm>
+              </p:grpSpPr>
+              <p:pic>
+                <p:nvPicPr>
+                  <p:cNvPr id="6" name="Picture 5"/>
+                  <p:cNvPicPr>
+                    <a:picLocks noChangeAspect="1"/>
+                  </p:cNvPicPr>
+                  <p:nvPr/>
+                </p:nvPicPr>
+                <p:blipFill rotWithShape="1">
+                  <a:blip r:embed="rId3" cstate="hqprint">
+                    <a:extLst>
+                      <a:ext uri="{28A0092B-C50C-407E-A947-70E740481C1C}">
+                        <a14:useLocalDpi xmlns:a14="http://schemas.microsoft.com/office/drawing/2010/main" val="0"/>
+                      </a:ext>
+                    </a:extLst>
+                  </a:blip>
+                  <a:srcRect l="18210" t="2222" r="18657" b="2638"/>
+                  <a:stretch/>
+                </p:blipFill>
+                <p:spPr>
+                  <a:xfrm>
+                    <a:off x="1676399" y="4021656"/>
+                    <a:ext cx="2588019" cy="2514600"/>
+                  </a:xfrm>
+                  <a:prstGeom prst="rect">
+                    <a:avLst/>
+                  </a:prstGeom>
+                </p:spPr>
+              </p:pic>
+              <p:sp>
+                <p:nvSpPr>
+                  <p:cNvPr id="7" name="Rectangle 6"/>
+                  <p:cNvSpPr/>
+                  <p:nvPr/>
+                </p:nvSpPr>
+                <p:spPr>
+                  <a:xfrm>
+                    <a:off x="2857500" y="5384769"/>
+                    <a:ext cx="466725" cy="311181"/>
+                  </a:xfrm>
+                  <a:prstGeom prst="rect">
+                    <a:avLst/>
+                  </a:prstGeom>
+                  <a:noFill/>
+                  <a:ln w="19050">
+                    <a:solidFill>
+                      <a:srgbClr val="FF0000"/>
+                    </a:solidFill>
+                  </a:ln>
+                </p:spPr>
+                <p:style>
+                  <a:lnRef idx="2">
+                    <a:schemeClr val="accent1">
+                      <a:shade val="50000"/>
+                    </a:schemeClr>
+                  </a:lnRef>
+                  <a:fillRef idx="1">
+                    <a:schemeClr val="accent1"/>
+                  </a:fillRef>
+                  <a:effectRef idx="0">
+                    <a:schemeClr val="accent1"/>
+                  </a:effectRef>
+                  <a:fontRef idx="minor">
+                    <a:schemeClr val="lt1"/>
+                  </a:fontRef>
+                </p:style>
+                <p:txBody>
+                  <a:bodyPr rtlCol="0" anchor="ctr"/>
+                  <a:lstStyle/>
+                  <a:p>
+                    <a:pPr algn="ctr"/>
+                    <a:endParaRPr lang="en-GB"/>
+                  </a:p>
+                </p:txBody>
+              </p:sp>
+            </p:grpSp>
+            <p:cxnSp>
+              <p:nvCxnSpPr>
+                <p:cNvPr id="13" name="Straight Connector 12"/>
+                <p:cNvCxnSpPr/>
+                <p:nvPr/>
+              </p:nvCxnSpPr>
+              <p:spPr>
+                <a:xfrm flipV="1">
+                  <a:off x="3429001" y="1898811"/>
+                  <a:ext cx="1847848" cy="2362126"/>
+                </a:xfrm>
+                <a:prstGeom prst="line">
+                  <a:avLst/>
+                </a:prstGeom>
+                <a:ln w="19050">
+                  <a:solidFill>
+                    <a:srgbClr val="FF0000"/>
+                  </a:solidFill>
+                </a:ln>
+              </p:spPr>
+              <p:style>
+                <a:lnRef idx="1">
+                  <a:schemeClr val="accent1"/>
+                </a:lnRef>
+                <a:fillRef idx="0">
+                  <a:schemeClr val="accent1"/>
+                </a:fillRef>
+                <a:effectRef idx="0">
+                  <a:schemeClr val="accent1"/>
+                </a:effectRef>
+                <a:fontRef idx="minor">
+                  <a:schemeClr val="tx1"/>
+                </a:fontRef>
+              </p:style>
+            </p:cxnSp>
+          </p:grpSp>
+          <p:grpSp>
+            <p:nvGrpSpPr>
+              <p:cNvPr id="19" name="Group 18"/>
+              <p:cNvGrpSpPr/>
+              <p:nvPr/>
+            </p:nvGrpSpPr>
+            <p:grpSpPr>
+              <a:xfrm>
+                <a:off x="3429001" y="1898811"/>
+                <a:ext cx="8367407" cy="4260110"/>
+                <a:chOff x="3429001" y="1898811"/>
+                <a:chExt cx="8367407" cy="4260110"/>
+              </a:xfrm>
+            </p:grpSpPr>
+            <p:sp>
+              <p:nvSpPr>
+                <p:cNvPr id="10" name="Rectangle 9"/>
+                <p:cNvSpPr/>
+                <p:nvPr/>
+              </p:nvSpPr>
+              <p:spPr>
+                <a:xfrm>
+                  <a:off x="5276850" y="1898811"/>
+                  <a:ext cx="6519558" cy="4260110"/>
+                </a:xfrm>
+                <a:prstGeom prst="rect">
+                  <a:avLst/>
+                </a:prstGeom>
+                <a:noFill/>
+                <a:ln w="19050">
+                  <a:solidFill>
+                    <a:srgbClr val="FF0000"/>
+                  </a:solidFill>
+                </a:ln>
+              </p:spPr>
+              <p:style>
+                <a:lnRef idx="2">
+                  <a:schemeClr val="accent1">
+                    <a:shade val="50000"/>
+                  </a:schemeClr>
+                </a:lnRef>
+                <a:fillRef idx="1">
+                  <a:schemeClr val="accent1"/>
+                </a:fillRef>
+                <a:effectRef idx="0">
+                  <a:schemeClr val="accent1"/>
+                </a:effectRef>
+                <a:fontRef idx="minor">
+                  <a:schemeClr val="lt1"/>
+                </a:fontRef>
+              </p:style>
+              <p:txBody>
+                <a:bodyPr rtlCol="0" anchor="ctr"/>
+                <a:lstStyle/>
+                <a:p>
+                  <a:pPr algn="ctr"/>
+                  <a:endParaRPr lang="en-GB"/>
+                </a:p>
+              </p:txBody>
+            </p:sp>
+            <p:cxnSp>
+              <p:nvCxnSpPr>
+                <p:cNvPr id="16" name="Straight Connector 15"/>
+                <p:cNvCxnSpPr/>
+                <p:nvPr/>
+              </p:nvCxnSpPr>
+              <p:spPr>
+                <a:xfrm>
+                  <a:off x="3429001" y="4572119"/>
+                  <a:ext cx="1847848" cy="1586802"/>
+                </a:xfrm>
+                <a:prstGeom prst="line">
+                  <a:avLst/>
+                </a:prstGeom>
+                <a:ln w="19050">
+                  <a:solidFill>
+                    <a:srgbClr val="FF0000"/>
+                  </a:solidFill>
+                </a:ln>
+              </p:spPr>
+              <p:style>
+                <a:lnRef idx="1">
+                  <a:schemeClr val="accent1"/>
+                </a:lnRef>
+                <a:fillRef idx="0">
+                  <a:schemeClr val="accent1"/>
+                </a:fillRef>
+                <a:effectRef idx="0">
+                  <a:schemeClr val="accent1"/>
+                </a:effectRef>
+                <a:fontRef idx="minor">
+                  <a:schemeClr val="tx1"/>
+                </a:fontRef>
+              </p:style>
+            </p:cxnSp>
+          </p:grpSp>
+        </p:grpSp>
+        <p:pic>
+          <p:nvPicPr>
+            <p:cNvPr id="21" name="Picture 20"/>
+            <p:cNvPicPr>
+              <a:picLocks noChangeAspect="1"/>
+            </p:cNvPicPr>
+            <p:nvPr/>
+          </p:nvPicPr>
+          <p:blipFill rotWithShape="1">
+            <a:blip r:embed="rId4">
+              <a:extLst>
+                <a:ext uri="{28A0092B-C50C-407E-A947-70E740481C1C}">
+                  <a14:useLocalDpi xmlns:a14="http://schemas.microsoft.com/office/drawing/2010/main" val="0"/>
+                </a:ext>
+              </a:extLst>
+            </a:blip>
+            <a:srcRect l="4778" r="6478" b="10000"/>
+            <a:stretch/>
+          </p:blipFill>
+          <p:spPr>
+            <a:xfrm>
+              <a:off x="5286374" y="1908336"/>
+              <a:ext cx="6500508" cy="4250585"/>
+            </a:xfrm>
+            <a:prstGeom prst="rect">
+              <a:avLst/>
+            </a:prstGeom>
+          </p:spPr>
+        </p:pic>
+      </p:grpSp>
     </p:spTree>
     <p:extLst>
       <p:ext uri="{BB962C8B-B14F-4D97-AF65-F5344CB8AC3E}">
-        <p14:creationId xmlns:p14="http://schemas.microsoft.com/office/powerpoint/2010/main" val="371862595"/>
+        <p14:creationId xmlns:p14="http://schemas.microsoft.com/office/powerpoint/2010/main" val="3042635550"/>
       </p:ext>
     </p:extLst>
   </p:cSld>
@@ -10966,18 +11362,18 @@
 </file>
 
 <file path=customXml/item2.xml><?xml version="1.0" encoding="utf-8"?>
-<p:properties xmlns:p="http://schemas.microsoft.com/office/2006/metadata/properties" xmlns:xsi="http://www.w3.org/2001/XMLSchema-instance" xmlns:pc="http://schemas.microsoft.com/office/infopath/2007/PartnerControls">
-  <documentManagement/>
-</p:properties>
-</file>
-
-<file path=customXml/item3.xml><?xml version="1.0" encoding="utf-8"?>
 <?mso-contentType ?>
 <FormTemplates xmlns="http://schemas.microsoft.com/sharepoint/v3/contenttype/forms">
   <Display>DocumentLibraryForm</Display>
   <Edit>DocumentLibraryForm</Edit>
   <New>DocumentLibraryForm</New>
 </FormTemplates>
+</file>
+
+<file path=customXml/item3.xml><?xml version="1.0" encoding="utf-8"?>
+<p:properties xmlns:p="http://schemas.microsoft.com/office/2006/metadata/properties" xmlns:xsi="http://www.w3.org/2001/XMLSchema-instance" xmlns:pc="http://schemas.microsoft.com/office/infopath/2007/PartnerControls">
+  <documentManagement/>
+</p:properties>
 </file>
 
 <file path=customXml/itemProps1.xml><?xml version="1.0" encoding="utf-8"?>
@@ -10999,6 +11395,14 @@
 </file>
 
 <file path=customXml/itemProps2.xml><?xml version="1.0" encoding="utf-8"?>
+<ds:datastoreItem xmlns:ds="http://schemas.openxmlformats.org/officeDocument/2006/customXml" ds:itemID="{6403E4D3-72DA-4289-91ED-DFF78CD471C1}">
+  <ds:schemaRefs>
+    <ds:schemaRef ds:uri="http://schemas.microsoft.com/sharepoint/v3/contenttype/forms"/>
+  </ds:schemaRefs>
+</ds:datastoreItem>
+</file>
+
+<file path=customXml/itemProps3.xml><?xml version="1.0" encoding="utf-8"?>
 <ds:datastoreItem xmlns:ds="http://schemas.openxmlformats.org/officeDocument/2006/customXml" ds:itemID="{876BEA9C-C2E3-41D9-B880-E6B12665A2B1}">
   <ds:schemaRefs>
     <ds:schemaRef ds:uri="http://purl.org/dc/elements/1.1/"/>
@@ -11012,12 +11416,4 @@
     <ds:schemaRef ds:uri="http://purl.org/dc/terms/"/>
   </ds:schemaRefs>
 </ds:datastoreItem>
-</file>
-
-<file path=customXml/itemProps3.xml><?xml version="1.0" encoding="utf-8"?>
-<ds:datastoreItem xmlns:ds="http://schemas.openxmlformats.org/officeDocument/2006/customXml" ds:itemID="{6403E4D3-72DA-4289-91ED-DFF78CD471C1}">
-  <ds:schemaRefs>
-    <ds:schemaRef ds:uri="http://schemas.microsoft.com/sharepoint/v3/contenttype/forms"/>
-  </ds:schemaRefs>
-</ds:datastoreItem>
 </file>
</xml_diff>